<commit_message>
pollev Fragen für 3 weitere Exkurse
</commit_message>
<xml_diff>
--- a/Folien/Exkurs_Fehlersuche.pptx
+++ b/Folien/Exkurs_Fehlersuche.pptx
@@ -5,7 +5,7 @@
     <p:sldMasterId id="2147483648" r:id="rId4"/>
   </p:sldMasterIdLst>
   <p:notesMasterIdLst>
-    <p:notesMasterId r:id="rId14"/>
+    <p:notesMasterId r:id="rId17"/>
   </p:notesMasterIdLst>
   <p:sldIdLst>
     <p:sldId id="291" r:id="rId5"/>
@@ -13,10 +13,13 @@
     <p:sldId id="317" r:id="rId7"/>
     <p:sldId id="318" r:id="rId8"/>
     <p:sldId id="320" r:id="rId9"/>
-    <p:sldId id="319" r:id="rId10"/>
-    <p:sldId id="321" r:id="rId11"/>
-    <p:sldId id="322" r:id="rId12"/>
-    <p:sldId id="315" r:id="rId13"/>
+    <p:sldId id="323" r:id="rId10"/>
+    <p:sldId id="324" r:id="rId11"/>
+    <p:sldId id="325" r:id="rId12"/>
+    <p:sldId id="319" r:id="rId13"/>
+    <p:sldId id="321" r:id="rId14"/>
+    <p:sldId id="322" r:id="rId15"/>
+    <p:sldId id="315" r:id="rId16"/>
   </p:sldIdLst>
   <p:sldSz cx="12192000" cy="6858000"/>
   <p:notesSz cx="6858000" cy="9144000"/>
@@ -933,7 +936,7 @@
           <a:p>
             <a:fld id="{1111EAE3-0D17-7D4D-B5C8-7430D3A14508}" type="datetimeFigureOut">
               <a:rPr lang="en-US" smtClean="0"/>
-              <a:t>3/16/22</a:t>
+              <a:t>3/5/23</a:t>
             </a:fld>
             <a:endParaRPr lang="en-US"/>
           </a:p>
@@ -1285,6 +1288,963 @@
 </p:notes>
 </file>
 
+<file path=ppt/notesSlides/notesSlide10.xml><?xml version="1.0" encoding="utf-8"?>
+<p:notes xmlns:a="http://schemas.openxmlformats.org/drawingml/2006/main" xmlns:r="http://schemas.openxmlformats.org/officeDocument/2006/relationships" xmlns:p="http://schemas.openxmlformats.org/presentationml/2006/main">
+  <p:cSld>
+    <p:spTree>
+      <p:nvGrpSpPr>
+        <p:cNvPr id="1" name=""/>
+        <p:cNvGrpSpPr/>
+        <p:nvPr/>
+      </p:nvGrpSpPr>
+      <p:grpSpPr>
+        <a:xfrm>
+          <a:off x="0" y="0"/>
+          <a:ext cx="0" cy="0"/>
+          <a:chOff x="0" y="0"/>
+          <a:chExt cx="0" cy="0"/>
+        </a:xfrm>
+      </p:grpSpPr>
+      <p:sp>
+        <p:nvSpPr>
+          <p:cNvPr id="2" name="Folienbildplatzhalter 1"/>
+          <p:cNvSpPr>
+            <a:spLocks noGrp="1" noRot="1" noChangeAspect="1"/>
+          </p:cNvSpPr>
+          <p:nvPr>
+            <p:ph type="sldImg"/>
+          </p:nvPr>
+        </p:nvSpPr>
+        <p:spPr/>
+      </p:sp>
+      <p:sp>
+        <p:nvSpPr>
+          <p:cNvPr id="3" name="Notizenplatzhalter 2"/>
+          <p:cNvSpPr>
+            <a:spLocks noGrp="1"/>
+          </p:cNvSpPr>
+          <p:nvPr>
+            <p:ph type="body" idx="1"/>
+          </p:nvPr>
+        </p:nvSpPr>
+        <p:spPr/>
+        <p:txBody>
+          <a:bodyPr/>
+          <a:lstStyle/>
+          <a:p>
+            <a:endParaRPr lang="de-DE"/>
+          </a:p>
+        </p:txBody>
+      </p:sp>
+      <p:sp>
+        <p:nvSpPr>
+          <p:cNvPr id="4" name="Foliennummernplatzhalter 3"/>
+          <p:cNvSpPr>
+            <a:spLocks noGrp="1"/>
+          </p:cNvSpPr>
+          <p:nvPr>
+            <p:ph type="sldNum" sz="quarter" idx="5"/>
+          </p:nvPr>
+        </p:nvSpPr>
+        <p:spPr/>
+        <p:txBody>
+          <a:bodyPr/>
+          <a:lstStyle/>
+          <a:p>
+            <a:fld id="{AD1D79F6-C8AD-5749-9DE6-19634A2965BA}" type="slidenum">
+              <a:rPr lang="en-US" smtClean="0"/>
+              <a:t>10</a:t>
+            </a:fld>
+            <a:endParaRPr lang="en-US"/>
+          </a:p>
+        </p:txBody>
+      </p:sp>
+    </p:spTree>
+    <p:extLst>
+      <p:ext uri="{BB962C8B-B14F-4D97-AF65-F5344CB8AC3E}">
+        <p14:creationId xmlns:p14="http://schemas.microsoft.com/office/powerpoint/2010/main" val="1520880587"/>
+      </p:ext>
+    </p:extLst>
+  </p:cSld>
+  <p:clrMapOvr>
+    <a:masterClrMapping/>
+  </p:clrMapOvr>
+</p:notes>
+</file>
+
+<file path=ppt/notesSlides/notesSlide11.xml><?xml version="1.0" encoding="utf-8"?>
+<p:notes xmlns:a="http://schemas.openxmlformats.org/drawingml/2006/main" xmlns:r="http://schemas.openxmlformats.org/officeDocument/2006/relationships" xmlns:p="http://schemas.openxmlformats.org/presentationml/2006/main">
+  <p:cSld>
+    <p:spTree>
+      <p:nvGrpSpPr>
+        <p:cNvPr id="1" name=""/>
+        <p:cNvGrpSpPr/>
+        <p:nvPr/>
+      </p:nvGrpSpPr>
+      <p:grpSpPr>
+        <a:xfrm>
+          <a:off x="0" y="0"/>
+          <a:ext cx="0" cy="0"/>
+          <a:chOff x="0" y="0"/>
+          <a:chExt cx="0" cy="0"/>
+        </a:xfrm>
+      </p:grpSpPr>
+      <p:sp>
+        <p:nvSpPr>
+          <p:cNvPr id="2" name="Folienbildplatzhalter 1"/>
+          <p:cNvSpPr>
+            <a:spLocks noGrp="1" noRot="1" noChangeAspect="1"/>
+          </p:cNvSpPr>
+          <p:nvPr>
+            <p:ph type="sldImg"/>
+          </p:nvPr>
+        </p:nvSpPr>
+        <p:spPr/>
+      </p:sp>
+      <p:sp>
+        <p:nvSpPr>
+          <p:cNvPr id="3" name="Notizenplatzhalter 2"/>
+          <p:cNvSpPr>
+            <a:spLocks noGrp="1"/>
+          </p:cNvSpPr>
+          <p:nvPr>
+            <p:ph type="body" idx="1"/>
+          </p:nvPr>
+        </p:nvSpPr>
+        <p:spPr/>
+        <p:txBody>
+          <a:bodyPr/>
+          <a:lstStyle/>
+          <a:p>
+            <a:endParaRPr lang="de-DE"/>
+          </a:p>
+        </p:txBody>
+      </p:sp>
+      <p:sp>
+        <p:nvSpPr>
+          <p:cNvPr id="4" name="Foliennummernplatzhalter 3"/>
+          <p:cNvSpPr>
+            <a:spLocks noGrp="1"/>
+          </p:cNvSpPr>
+          <p:nvPr>
+            <p:ph type="sldNum" sz="quarter" idx="5"/>
+          </p:nvPr>
+        </p:nvSpPr>
+        <p:spPr/>
+        <p:txBody>
+          <a:bodyPr/>
+          <a:lstStyle/>
+          <a:p>
+            <a:fld id="{AD1D79F6-C8AD-5749-9DE6-19634A2965BA}" type="slidenum">
+              <a:rPr lang="en-US" smtClean="0"/>
+              <a:t>11</a:t>
+            </a:fld>
+            <a:endParaRPr lang="en-US"/>
+          </a:p>
+        </p:txBody>
+      </p:sp>
+    </p:spTree>
+    <p:extLst>
+      <p:ext uri="{BB962C8B-B14F-4D97-AF65-F5344CB8AC3E}">
+        <p14:creationId xmlns:p14="http://schemas.microsoft.com/office/powerpoint/2010/main" val="4106318288"/>
+      </p:ext>
+    </p:extLst>
+  </p:cSld>
+  <p:clrMapOvr>
+    <a:masterClrMapping/>
+  </p:clrMapOvr>
+</p:notes>
+</file>
+
+<file path=ppt/notesSlides/notesSlide12.xml><?xml version="1.0" encoding="utf-8"?>
+<p:notes xmlns:a="http://schemas.openxmlformats.org/drawingml/2006/main" xmlns:r="http://schemas.openxmlformats.org/officeDocument/2006/relationships" xmlns:p="http://schemas.openxmlformats.org/presentationml/2006/main">
+  <p:cSld>
+    <p:spTree>
+      <p:nvGrpSpPr>
+        <p:cNvPr id="1" name=""/>
+        <p:cNvGrpSpPr/>
+        <p:nvPr/>
+      </p:nvGrpSpPr>
+      <p:grpSpPr>
+        <a:xfrm>
+          <a:off x="0" y="0"/>
+          <a:ext cx="0" cy="0"/>
+          <a:chOff x="0" y="0"/>
+          <a:chExt cx="0" cy="0"/>
+        </a:xfrm>
+      </p:grpSpPr>
+      <p:sp>
+        <p:nvSpPr>
+          <p:cNvPr id="2" name="Folienbildplatzhalter 1"/>
+          <p:cNvSpPr>
+            <a:spLocks noGrp="1" noRot="1" noChangeAspect="1"/>
+          </p:cNvSpPr>
+          <p:nvPr>
+            <p:ph type="sldImg"/>
+          </p:nvPr>
+        </p:nvSpPr>
+        <p:spPr/>
+      </p:sp>
+      <p:sp>
+        <p:nvSpPr>
+          <p:cNvPr id="3" name="Notizenplatzhalter 2"/>
+          <p:cNvSpPr>
+            <a:spLocks noGrp="1"/>
+          </p:cNvSpPr>
+          <p:nvPr>
+            <p:ph type="body" idx="1"/>
+          </p:nvPr>
+        </p:nvSpPr>
+        <p:spPr/>
+        <p:txBody>
+          <a:bodyPr/>
+          <a:lstStyle/>
+          <a:p>
+            <a:endParaRPr lang="de-DE"/>
+          </a:p>
+        </p:txBody>
+      </p:sp>
+      <p:sp>
+        <p:nvSpPr>
+          <p:cNvPr id="4" name="Foliennummernplatzhalter 3"/>
+          <p:cNvSpPr>
+            <a:spLocks noGrp="1"/>
+          </p:cNvSpPr>
+          <p:nvPr>
+            <p:ph type="sldNum" sz="quarter" idx="5"/>
+          </p:nvPr>
+        </p:nvSpPr>
+        <p:spPr/>
+        <p:txBody>
+          <a:bodyPr/>
+          <a:lstStyle/>
+          <a:p>
+            <a:fld id="{AD1D79F6-C8AD-5749-9DE6-19634A2965BA}" type="slidenum">
+              <a:rPr lang="en-US" smtClean="0"/>
+              <a:t>12</a:t>
+            </a:fld>
+            <a:endParaRPr lang="en-US"/>
+          </a:p>
+        </p:txBody>
+      </p:sp>
+    </p:spTree>
+    <p:extLst>
+      <p:ext uri="{BB962C8B-B14F-4D97-AF65-F5344CB8AC3E}">
+        <p14:creationId xmlns:p14="http://schemas.microsoft.com/office/powerpoint/2010/main" val="668601332"/>
+      </p:ext>
+    </p:extLst>
+  </p:cSld>
+  <p:clrMapOvr>
+    <a:masterClrMapping/>
+  </p:clrMapOvr>
+</p:notes>
+</file>
+
+<file path=ppt/notesSlides/notesSlide2.xml><?xml version="1.0" encoding="utf-8"?>
+<p:notes xmlns:a="http://schemas.openxmlformats.org/drawingml/2006/main" xmlns:r="http://schemas.openxmlformats.org/officeDocument/2006/relationships" xmlns:p="http://schemas.openxmlformats.org/presentationml/2006/main">
+  <p:cSld>
+    <p:spTree>
+      <p:nvGrpSpPr>
+        <p:cNvPr id="1" name=""/>
+        <p:cNvGrpSpPr/>
+        <p:nvPr/>
+      </p:nvGrpSpPr>
+      <p:grpSpPr>
+        <a:xfrm>
+          <a:off x="0" y="0"/>
+          <a:ext cx="0" cy="0"/>
+          <a:chOff x="0" y="0"/>
+          <a:chExt cx="0" cy="0"/>
+        </a:xfrm>
+      </p:grpSpPr>
+      <p:sp>
+        <p:nvSpPr>
+          <p:cNvPr id="2" name="Folienbildplatzhalter 1"/>
+          <p:cNvSpPr>
+            <a:spLocks noGrp="1" noRot="1" noChangeAspect="1"/>
+          </p:cNvSpPr>
+          <p:nvPr>
+            <p:ph type="sldImg"/>
+          </p:nvPr>
+        </p:nvSpPr>
+        <p:spPr/>
+      </p:sp>
+      <p:sp>
+        <p:nvSpPr>
+          <p:cNvPr id="3" name="Notizenplatzhalter 2"/>
+          <p:cNvSpPr>
+            <a:spLocks noGrp="1"/>
+          </p:cNvSpPr>
+          <p:nvPr>
+            <p:ph type="body" idx="1"/>
+          </p:nvPr>
+        </p:nvSpPr>
+        <p:spPr/>
+        <p:txBody>
+          <a:bodyPr/>
+          <a:lstStyle/>
+          <a:p>
+            <a:endParaRPr lang="de-DE"/>
+          </a:p>
+        </p:txBody>
+      </p:sp>
+      <p:sp>
+        <p:nvSpPr>
+          <p:cNvPr id="4" name="Foliennummernplatzhalter 3"/>
+          <p:cNvSpPr>
+            <a:spLocks noGrp="1"/>
+          </p:cNvSpPr>
+          <p:nvPr>
+            <p:ph type="sldNum" sz="quarter" idx="5"/>
+          </p:nvPr>
+        </p:nvSpPr>
+        <p:spPr/>
+        <p:txBody>
+          <a:bodyPr/>
+          <a:lstStyle/>
+          <a:p>
+            <a:fld id="{AD1D79F6-C8AD-5749-9DE6-19634A2965BA}" type="slidenum">
+              <a:rPr lang="en-US" smtClean="0"/>
+              <a:t>2</a:t>
+            </a:fld>
+            <a:endParaRPr lang="en-US"/>
+          </a:p>
+        </p:txBody>
+      </p:sp>
+    </p:spTree>
+    <p:extLst>
+      <p:ext uri="{BB962C8B-B14F-4D97-AF65-F5344CB8AC3E}">
+        <p14:creationId xmlns:p14="http://schemas.microsoft.com/office/powerpoint/2010/main" val="193369365"/>
+      </p:ext>
+    </p:extLst>
+  </p:cSld>
+  <p:clrMapOvr>
+    <a:masterClrMapping/>
+  </p:clrMapOvr>
+</p:notes>
+</file>
+
+<file path=ppt/notesSlides/notesSlide3.xml><?xml version="1.0" encoding="utf-8"?>
+<p:notes xmlns:a="http://schemas.openxmlformats.org/drawingml/2006/main" xmlns:r="http://schemas.openxmlformats.org/officeDocument/2006/relationships" xmlns:p="http://schemas.openxmlformats.org/presentationml/2006/main">
+  <p:cSld>
+    <p:spTree>
+      <p:nvGrpSpPr>
+        <p:cNvPr id="1" name=""/>
+        <p:cNvGrpSpPr/>
+        <p:nvPr/>
+      </p:nvGrpSpPr>
+      <p:grpSpPr>
+        <a:xfrm>
+          <a:off x="0" y="0"/>
+          <a:ext cx="0" cy="0"/>
+          <a:chOff x="0" y="0"/>
+          <a:chExt cx="0" cy="0"/>
+        </a:xfrm>
+      </p:grpSpPr>
+      <p:sp>
+        <p:nvSpPr>
+          <p:cNvPr id="2" name="Folienbildplatzhalter 1"/>
+          <p:cNvSpPr>
+            <a:spLocks noGrp="1" noRot="1" noChangeAspect="1"/>
+          </p:cNvSpPr>
+          <p:nvPr>
+            <p:ph type="sldImg"/>
+          </p:nvPr>
+        </p:nvSpPr>
+        <p:spPr/>
+      </p:sp>
+      <p:sp>
+        <p:nvSpPr>
+          <p:cNvPr id="3" name="Notizenplatzhalter 2"/>
+          <p:cNvSpPr>
+            <a:spLocks noGrp="1"/>
+          </p:cNvSpPr>
+          <p:nvPr>
+            <p:ph type="body" idx="1"/>
+          </p:nvPr>
+        </p:nvSpPr>
+        <p:spPr/>
+        <p:txBody>
+          <a:bodyPr/>
+          <a:lstStyle/>
+          <a:p>
+            <a:endParaRPr lang="de-DE"/>
+          </a:p>
+        </p:txBody>
+      </p:sp>
+      <p:sp>
+        <p:nvSpPr>
+          <p:cNvPr id="4" name="Foliennummernplatzhalter 3"/>
+          <p:cNvSpPr>
+            <a:spLocks noGrp="1"/>
+          </p:cNvSpPr>
+          <p:nvPr>
+            <p:ph type="sldNum" sz="quarter" idx="5"/>
+          </p:nvPr>
+        </p:nvSpPr>
+        <p:spPr/>
+        <p:txBody>
+          <a:bodyPr/>
+          <a:lstStyle/>
+          <a:p>
+            <a:fld id="{AD1D79F6-C8AD-5749-9DE6-19634A2965BA}" type="slidenum">
+              <a:rPr lang="en-US" smtClean="0"/>
+              <a:t>3</a:t>
+            </a:fld>
+            <a:endParaRPr lang="en-US"/>
+          </a:p>
+        </p:txBody>
+      </p:sp>
+    </p:spTree>
+    <p:extLst>
+      <p:ext uri="{BB962C8B-B14F-4D97-AF65-F5344CB8AC3E}">
+        <p14:creationId xmlns:p14="http://schemas.microsoft.com/office/powerpoint/2010/main" val="2330948188"/>
+      </p:ext>
+    </p:extLst>
+  </p:cSld>
+  <p:clrMapOvr>
+    <a:masterClrMapping/>
+  </p:clrMapOvr>
+</p:notes>
+</file>
+
+<file path=ppt/notesSlides/notesSlide4.xml><?xml version="1.0" encoding="utf-8"?>
+<p:notes xmlns:a="http://schemas.openxmlformats.org/drawingml/2006/main" xmlns:r="http://schemas.openxmlformats.org/officeDocument/2006/relationships" xmlns:p="http://schemas.openxmlformats.org/presentationml/2006/main">
+  <p:cSld>
+    <p:spTree>
+      <p:nvGrpSpPr>
+        <p:cNvPr id="1" name=""/>
+        <p:cNvGrpSpPr/>
+        <p:nvPr/>
+      </p:nvGrpSpPr>
+      <p:grpSpPr>
+        <a:xfrm>
+          <a:off x="0" y="0"/>
+          <a:ext cx="0" cy="0"/>
+          <a:chOff x="0" y="0"/>
+          <a:chExt cx="0" cy="0"/>
+        </a:xfrm>
+      </p:grpSpPr>
+      <p:sp>
+        <p:nvSpPr>
+          <p:cNvPr id="2" name="Folienbildplatzhalter 1"/>
+          <p:cNvSpPr>
+            <a:spLocks noGrp="1" noRot="1" noChangeAspect="1"/>
+          </p:cNvSpPr>
+          <p:nvPr>
+            <p:ph type="sldImg"/>
+          </p:nvPr>
+        </p:nvSpPr>
+        <p:spPr/>
+      </p:sp>
+      <p:sp>
+        <p:nvSpPr>
+          <p:cNvPr id="3" name="Notizenplatzhalter 2"/>
+          <p:cNvSpPr>
+            <a:spLocks noGrp="1"/>
+          </p:cNvSpPr>
+          <p:nvPr>
+            <p:ph type="body" idx="1"/>
+          </p:nvPr>
+        </p:nvSpPr>
+        <p:spPr/>
+        <p:txBody>
+          <a:bodyPr/>
+          <a:lstStyle/>
+          <a:p>
+            <a:endParaRPr lang="de-DE"/>
+          </a:p>
+        </p:txBody>
+      </p:sp>
+      <p:sp>
+        <p:nvSpPr>
+          <p:cNvPr id="4" name="Foliennummernplatzhalter 3"/>
+          <p:cNvSpPr>
+            <a:spLocks noGrp="1"/>
+          </p:cNvSpPr>
+          <p:nvPr>
+            <p:ph type="sldNum" sz="quarter" idx="5"/>
+          </p:nvPr>
+        </p:nvSpPr>
+        <p:spPr/>
+        <p:txBody>
+          <a:bodyPr/>
+          <a:lstStyle/>
+          <a:p>
+            <a:fld id="{AD1D79F6-C8AD-5749-9DE6-19634A2965BA}" type="slidenum">
+              <a:rPr lang="en-US" smtClean="0"/>
+              <a:t>4</a:t>
+            </a:fld>
+            <a:endParaRPr lang="en-US"/>
+          </a:p>
+        </p:txBody>
+      </p:sp>
+    </p:spTree>
+    <p:extLst>
+      <p:ext uri="{BB962C8B-B14F-4D97-AF65-F5344CB8AC3E}">
+        <p14:creationId xmlns:p14="http://schemas.microsoft.com/office/powerpoint/2010/main" val="1453521434"/>
+      </p:ext>
+    </p:extLst>
+  </p:cSld>
+  <p:clrMapOvr>
+    <a:masterClrMapping/>
+  </p:clrMapOvr>
+</p:notes>
+</file>
+
+<file path=ppt/notesSlides/notesSlide5.xml><?xml version="1.0" encoding="utf-8"?>
+<p:notes xmlns:a="http://schemas.openxmlformats.org/drawingml/2006/main" xmlns:r="http://schemas.openxmlformats.org/officeDocument/2006/relationships" xmlns:p="http://schemas.openxmlformats.org/presentationml/2006/main">
+  <p:cSld>
+    <p:spTree>
+      <p:nvGrpSpPr>
+        <p:cNvPr id="1" name=""/>
+        <p:cNvGrpSpPr/>
+        <p:nvPr/>
+      </p:nvGrpSpPr>
+      <p:grpSpPr>
+        <a:xfrm>
+          <a:off x="0" y="0"/>
+          <a:ext cx="0" cy="0"/>
+          <a:chOff x="0" y="0"/>
+          <a:chExt cx="0" cy="0"/>
+        </a:xfrm>
+      </p:grpSpPr>
+      <p:sp>
+        <p:nvSpPr>
+          <p:cNvPr id="2" name="Folienbildplatzhalter 1"/>
+          <p:cNvSpPr>
+            <a:spLocks noGrp="1" noRot="1" noChangeAspect="1"/>
+          </p:cNvSpPr>
+          <p:nvPr>
+            <p:ph type="sldImg"/>
+          </p:nvPr>
+        </p:nvSpPr>
+        <p:spPr/>
+      </p:sp>
+      <p:sp>
+        <p:nvSpPr>
+          <p:cNvPr id="3" name="Notizenplatzhalter 2"/>
+          <p:cNvSpPr>
+            <a:spLocks noGrp="1"/>
+          </p:cNvSpPr>
+          <p:nvPr>
+            <p:ph type="body" idx="1"/>
+          </p:nvPr>
+        </p:nvSpPr>
+        <p:spPr/>
+        <p:txBody>
+          <a:bodyPr/>
+          <a:lstStyle/>
+          <a:p>
+            <a:endParaRPr lang="de-DE"/>
+          </a:p>
+        </p:txBody>
+      </p:sp>
+      <p:sp>
+        <p:nvSpPr>
+          <p:cNvPr id="4" name="Foliennummernplatzhalter 3"/>
+          <p:cNvSpPr>
+            <a:spLocks noGrp="1"/>
+          </p:cNvSpPr>
+          <p:nvPr>
+            <p:ph type="sldNum" sz="quarter" idx="5"/>
+          </p:nvPr>
+        </p:nvSpPr>
+        <p:spPr/>
+        <p:txBody>
+          <a:bodyPr/>
+          <a:lstStyle/>
+          <a:p>
+            <a:fld id="{AD1D79F6-C8AD-5749-9DE6-19634A2965BA}" type="slidenum">
+              <a:rPr lang="en-US" smtClean="0"/>
+              <a:t>5</a:t>
+            </a:fld>
+            <a:endParaRPr lang="en-US"/>
+          </a:p>
+        </p:txBody>
+      </p:sp>
+    </p:spTree>
+    <p:extLst>
+      <p:ext uri="{BB962C8B-B14F-4D97-AF65-F5344CB8AC3E}">
+        <p14:creationId xmlns:p14="http://schemas.microsoft.com/office/powerpoint/2010/main" val="3039680407"/>
+      </p:ext>
+    </p:extLst>
+  </p:cSld>
+  <p:clrMapOvr>
+    <a:masterClrMapping/>
+  </p:clrMapOvr>
+</p:notes>
+</file>
+
+<file path=ppt/notesSlides/notesSlide6.xml><?xml version="1.0" encoding="utf-8"?>
+<p:notes xmlns:a="http://schemas.openxmlformats.org/drawingml/2006/main" xmlns:r="http://schemas.openxmlformats.org/officeDocument/2006/relationships" xmlns:p="http://schemas.openxmlformats.org/presentationml/2006/main">
+  <p:cSld>
+    <p:spTree>
+      <p:nvGrpSpPr>
+        <p:cNvPr id="1" name=""/>
+        <p:cNvGrpSpPr/>
+        <p:nvPr/>
+      </p:nvGrpSpPr>
+      <p:grpSpPr>
+        <a:xfrm>
+          <a:off x="0" y="0"/>
+          <a:ext cx="0" cy="0"/>
+          <a:chOff x="0" y="0"/>
+          <a:chExt cx="0" cy="0"/>
+        </a:xfrm>
+      </p:grpSpPr>
+      <p:sp>
+        <p:nvSpPr>
+          <p:cNvPr id="2" name="Folienbildplatzhalter 1"/>
+          <p:cNvSpPr>
+            <a:spLocks noGrp="1" noRot="1" noChangeAspect="1"/>
+          </p:cNvSpPr>
+          <p:nvPr>
+            <p:ph type="sldImg"/>
+          </p:nvPr>
+        </p:nvSpPr>
+        <p:spPr/>
+      </p:sp>
+      <p:sp>
+        <p:nvSpPr>
+          <p:cNvPr id="3" name="Notizenplatzhalter 2"/>
+          <p:cNvSpPr>
+            <a:spLocks noGrp="1"/>
+          </p:cNvSpPr>
+          <p:nvPr>
+            <p:ph type="body" idx="1"/>
+          </p:nvPr>
+        </p:nvSpPr>
+        <p:spPr/>
+        <p:txBody>
+          <a:bodyPr/>
+          <a:lstStyle/>
+          <a:p>
+            <a:r>
+              <a:rPr lang="de-DE"/>
+              <a:t>Do not modify the notes in this section to avoid tampering with the Poll Everywhere activity.
+More info at polleverywhere.com/support
+Was ist der Zweck der Verwendung des Serial Monitors in Arduino-Programmen?</a:t>
+            </a:r>
+          </a:p>
+          <a:p>
+            <a:r>
+              <a:rPr lang="de-DE"/>
+              <a:t>https://www.polleverywhere.com/multiple_choice_polls/HqLooxXn1odvZujj1fu2x?display_state=instructions&amp;activity_state=opened&amp;state=opened&amp;flow=Instructor&amp;onscreen=persist</a:t>
+            </a:r>
+          </a:p>
+        </p:txBody>
+      </p:sp>
+      <p:sp>
+        <p:nvSpPr>
+          <p:cNvPr id="4" name="Foliennummernplatzhalter 3"/>
+          <p:cNvSpPr>
+            <a:spLocks noGrp="1"/>
+          </p:cNvSpPr>
+          <p:nvPr>
+            <p:ph type="sldNum" sz="quarter" idx="5"/>
+          </p:nvPr>
+        </p:nvSpPr>
+        <p:spPr/>
+        <p:txBody>
+          <a:bodyPr/>
+          <a:lstStyle/>
+          <a:p>
+            <a:fld id="{AD1D79F6-C8AD-5749-9DE6-19634A2965BA}" type="slidenum">
+              <a:rPr lang="en-US" smtClean="0"/>
+              <a:t>6</a:t>
+            </a:fld>
+            <a:endParaRPr lang="en-US"/>
+          </a:p>
+        </p:txBody>
+      </p:sp>
+    </p:spTree>
+    <p:extLst>
+      <p:ext uri="{BB962C8B-B14F-4D97-AF65-F5344CB8AC3E}">
+        <p14:creationId xmlns:p14="http://schemas.microsoft.com/office/powerpoint/2010/main" val="3824400629"/>
+      </p:ext>
+    </p:extLst>
+  </p:cSld>
+  <p:clrMapOvr>
+    <a:masterClrMapping/>
+  </p:clrMapOvr>
+</p:notes>
+</file>
+
+<file path=ppt/notesSlides/notesSlide7.xml><?xml version="1.0" encoding="utf-8"?>
+<p:notes xmlns:a="http://schemas.openxmlformats.org/drawingml/2006/main" xmlns:r="http://schemas.openxmlformats.org/officeDocument/2006/relationships" xmlns:p="http://schemas.openxmlformats.org/presentationml/2006/main">
+  <p:cSld>
+    <p:spTree>
+      <p:nvGrpSpPr>
+        <p:cNvPr id="1" name=""/>
+        <p:cNvGrpSpPr/>
+        <p:nvPr/>
+      </p:nvGrpSpPr>
+      <p:grpSpPr>
+        <a:xfrm>
+          <a:off x="0" y="0"/>
+          <a:ext cx="0" cy="0"/>
+          <a:chOff x="0" y="0"/>
+          <a:chExt cx="0" cy="0"/>
+        </a:xfrm>
+      </p:grpSpPr>
+      <p:sp>
+        <p:nvSpPr>
+          <p:cNvPr id="2" name="Folienbildplatzhalter 1"/>
+          <p:cNvSpPr>
+            <a:spLocks noGrp="1" noRot="1" noChangeAspect="1"/>
+          </p:cNvSpPr>
+          <p:nvPr>
+            <p:ph type="sldImg"/>
+          </p:nvPr>
+        </p:nvSpPr>
+        <p:spPr/>
+      </p:sp>
+      <p:sp>
+        <p:nvSpPr>
+          <p:cNvPr id="3" name="Notizenplatzhalter 2"/>
+          <p:cNvSpPr>
+            <a:spLocks noGrp="1"/>
+          </p:cNvSpPr>
+          <p:nvPr>
+            <p:ph type="body" idx="1"/>
+          </p:nvPr>
+        </p:nvSpPr>
+        <p:spPr/>
+        <p:txBody>
+          <a:bodyPr/>
+          <a:lstStyle/>
+          <a:p>
+            <a:r>
+              <a:rPr lang="de-DE"/>
+              <a:t>Do not modify the notes in this section to avoid tampering with the Poll Everywhere activity.
+More info at polleverywhere.com/support
+Was ist der Zweck der Verwendung des Serial Monitors in Arduino-Programmen?</a:t>
+            </a:r>
+          </a:p>
+          <a:p>
+            <a:r>
+              <a:rPr lang="de-DE"/>
+              <a:t>https://www.polleverywhere.com/multiple_choice_polls/HqLooxXn1odvZujj1fu2x?display_state=chart&amp;activity_state=closed&amp;state=closed&amp;flow=Instructor&amp;onscreen=persist</a:t>
+            </a:r>
+          </a:p>
+        </p:txBody>
+      </p:sp>
+      <p:sp>
+        <p:nvSpPr>
+          <p:cNvPr id="4" name="Foliennummernplatzhalter 3"/>
+          <p:cNvSpPr>
+            <a:spLocks noGrp="1"/>
+          </p:cNvSpPr>
+          <p:nvPr>
+            <p:ph type="sldNum" sz="quarter" idx="5"/>
+          </p:nvPr>
+        </p:nvSpPr>
+        <p:spPr/>
+        <p:txBody>
+          <a:bodyPr/>
+          <a:lstStyle/>
+          <a:p>
+            <a:fld id="{AD1D79F6-C8AD-5749-9DE6-19634A2965BA}" type="slidenum">
+              <a:rPr lang="en-US" smtClean="0"/>
+              <a:t>7</a:t>
+            </a:fld>
+            <a:endParaRPr lang="en-US"/>
+          </a:p>
+        </p:txBody>
+      </p:sp>
+    </p:spTree>
+    <p:extLst>
+      <p:ext uri="{BB962C8B-B14F-4D97-AF65-F5344CB8AC3E}">
+        <p14:creationId xmlns:p14="http://schemas.microsoft.com/office/powerpoint/2010/main" val="1540821262"/>
+      </p:ext>
+    </p:extLst>
+  </p:cSld>
+  <p:clrMapOvr>
+    <a:masterClrMapping/>
+  </p:clrMapOvr>
+</p:notes>
+</file>
+
+<file path=ppt/notesSlides/notesSlide8.xml><?xml version="1.0" encoding="utf-8"?>
+<p:notes xmlns:a="http://schemas.openxmlformats.org/drawingml/2006/main" xmlns:r="http://schemas.openxmlformats.org/officeDocument/2006/relationships" xmlns:p="http://schemas.openxmlformats.org/presentationml/2006/main">
+  <p:cSld>
+    <p:spTree>
+      <p:nvGrpSpPr>
+        <p:cNvPr id="1" name=""/>
+        <p:cNvGrpSpPr/>
+        <p:nvPr/>
+      </p:nvGrpSpPr>
+      <p:grpSpPr>
+        <a:xfrm>
+          <a:off x="0" y="0"/>
+          <a:ext cx="0" cy="0"/>
+          <a:chOff x="0" y="0"/>
+          <a:chExt cx="0" cy="0"/>
+        </a:xfrm>
+      </p:grpSpPr>
+      <p:sp>
+        <p:nvSpPr>
+          <p:cNvPr id="2" name="Folienbildplatzhalter 1"/>
+          <p:cNvSpPr>
+            <a:spLocks noGrp="1" noRot="1" noChangeAspect="1"/>
+          </p:cNvSpPr>
+          <p:nvPr>
+            <p:ph type="sldImg"/>
+          </p:nvPr>
+        </p:nvSpPr>
+        <p:spPr/>
+      </p:sp>
+      <p:sp>
+        <p:nvSpPr>
+          <p:cNvPr id="3" name="Notizenplatzhalter 2"/>
+          <p:cNvSpPr>
+            <a:spLocks noGrp="1"/>
+          </p:cNvSpPr>
+          <p:nvPr>
+            <p:ph type="body" idx="1"/>
+          </p:nvPr>
+        </p:nvSpPr>
+        <p:spPr/>
+        <p:txBody>
+          <a:bodyPr/>
+          <a:lstStyle/>
+          <a:p>
+            <a:r>
+              <a:rPr lang="de-DE"/>
+              <a:t>Do not modify the notes in this section to avoid tampering with the Poll Everywhere activity.
+More info at polleverywhere.com/support
+Was ist der Zweck der Verwendung des Serial Monitors in Arduino-Programmen?</a:t>
+            </a:r>
+          </a:p>
+          <a:p>
+            <a:r>
+              <a:rPr lang="de-DE"/>
+              <a:t>https://www.polleverywhere.com/multiple_choice_polls/HqLooxXn1odvZujj1fu2x?display_state=chart&amp;activity_state=closed&amp;display=correctness&amp;state=closed&amp;flow=Instructor&amp;onscreen=persist</a:t>
+            </a:r>
+          </a:p>
+        </p:txBody>
+      </p:sp>
+      <p:sp>
+        <p:nvSpPr>
+          <p:cNvPr id="4" name="Foliennummernplatzhalter 3"/>
+          <p:cNvSpPr>
+            <a:spLocks noGrp="1"/>
+          </p:cNvSpPr>
+          <p:nvPr>
+            <p:ph type="sldNum" sz="quarter" idx="5"/>
+          </p:nvPr>
+        </p:nvSpPr>
+        <p:spPr/>
+        <p:txBody>
+          <a:bodyPr/>
+          <a:lstStyle/>
+          <a:p>
+            <a:fld id="{AD1D79F6-C8AD-5749-9DE6-19634A2965BA}" type="slidenum">
+              <a:rPr lang="en-US" smtClean="0"/>
+              <a:t>8</a:t>
+            </a:fld>
+            <a:endParaRPr lang="en-US"/>
+          </a:p>
+        </p:txBody>
+      </p:sp>
+    </p:spTree>
+    <p:extLst>
+      <p:ext uri="{BB962C8B-B14F-4D97-AF65-F5344CB8AC3E}">
+        <p14:creationId xmlns:p14="http://schemas.microsoft.com/office/powerpoint/2010/main" val="1302307840"/>
+      </p:ext>
+    </p:extLst>
+  </p:cSld>
+  <p:clrMapOvr>
+    <a:masterClrMapping/>
+  </p:clrMapOvr>
+</p:notes>
+</file>
+
+<file path=ppt/notesSlides/notesSlide9.xml><?xml version="1.0" encoding="utf-8"?>
+<p:notes xmlns:a="http://schemas.openxmlformats.org/drawingml/2006/main" xmlns:r="http://schemas.openxmlformats.org/officeDocument/2006/relationships" xmlns:p="http://schemas.openxmlformats.org/presentationml/2006/main">
+  <p:cSld>
+    <p:spTree>
+      <p:nvGrpSpPr>
+        <p:cNvPr id="1" name=""/>
+        <p:cNvGrpSpPr/>
+        <p:nvPr/>
+      </p:nvGrpSpPr>
+      <p:grpSpPr>
+        <a:xfrm>
+          <a:off x="0" y="0"/>
+          <a:ext cx="0" cy="0"/>
+          <a:chOff x="0" y="0"/>
+          <a:chExt cx="0" cy="0"/>
+        </a:xfrm>
+      </p:grpSpPr>
+      <p:sp>
+        <p:nvSpPr>
+          <p:cNvPr id="2" name="Folienbildplatzhalter 1"/>
+          <p:cNvSpPr>
+            <a:spLocks noGrp="1" noRot="1" noChangeAspect="1"/>
+          </p:cNvSpPr>
+          <p:nvPr>
+            <p:ph type="sldImg"/>
+          </p:nvPr>
+        </p:nvSpPr>
+        <p:spPr/>
+      </p:sp>
+      <p:sp>
+        <p:nvSpPr>
+          <p:cNvPr id="3" name="Notizenplatzhalter 2"/>
+          <p:cNvSpPr>
+            <a:spLocks noGrp="1"/>
+          </p:cNvSpPr>
+          <p:nvPr>
+            <p:ph type="body" idx="1"/>
+          </p:nvPr>
+        </p:nvSpPr>
+        <p:spPr/>
+        <p:txBody>
+          <a:bodyPr/>
+          <a:lstStyle/>
+          <a:p>
+            <a:endParaRPr lang="de-DE"/>
+          </a:p>
+        </p:txBody>
+      </p:sp>
+      <p:sp>
+        <p:nvSpPr>
+          <p:cNvPr id="4" name="Foliennummernplatzhalter 3"/>
+          <p:cNvSpPr>
+            <a:spLocks noGrp="1"/>
+          </p:cNvSpPr>
+          <p:nvPr>
+            <p:ph type="sldNum" sz="quarter" idx="5"/>
+          </p:nvPr>
+        </p:nvSpPr>
+        <p:spPr/>
+        <p:txBody>
+          <a:bodyPr/>
+          <a:lstStyle/>
+          <a:p>
+            <a:fld id="{AD1D79F6-C8AD-5749-9DE6-19634A2965BA}" type="slidenum">
+              <a:rPr lang="en-US" smtClean="0"/>
+              <a:t>9</a:t>
+            </a:fld>
+            <a:endParaRPr lang="en-US"/>
+          </a:p>
+        </p:txBody>
+      </p:sp>
+    </p:spTree>
+    <p:extLst>
+      <p:ext uri="{BB962C8B-B14F-4D97-AF65-F5344CB8AC3E}">
+        <p14:creationId xmlns:p14="http://schemas.microsoft.com/office/powerpoint/2010/main" val="3832721276"/>
+      </p:ext>
+    </p:extLst>
+  </p:cSld>
+  <p:clrMapOvr>
+    <a:masterClrMapping/>
+  </p:clrMapOvr>
+</p:notes>
+</file>
+
 <file path=ppt/slideLayouts/slideLayout1.xml><?xml version="1.0" encoding="utf-8"?>
 <p:sldLayout xmlns:a="http://schemas.openxmlformats.org/drawingml/2006/main" xmlns:r="http://schemas.openxmlformats.org/officeDocument/2006/relationships" xmlns:p="http://schemas.openxmlformats.org/presentationml/2006/main" type="title" preserve="1">
   <p:cSld name="Title Slide">
@@ -1432,7 +2392,7 @@
           <a:p>
             <a:fld id="{46878720-212C-42BB-B356-99628BFE1EBF}" type="datetimeFigureOut">
               <a:rPr lang="en-US" smtClean="0"/>
-              <a:t>3/16/22</a:t>
+              <a:t>3/5/23</a:t>
             </a:fld>
             <a:endParaRPr lang="en-US"/>
           </a:p>
@@ -1630,7 +2590,7 @@
           <a:p>
             <a:fld id="{46878720-212C-42BB-B356-99628BFE1EBF}" type="datetimeFigureOut">
               <a:rPr lang="en-US" smtClean="0"/>
-              <a:t>3/16/22</a:t>
+              <a:t>3/5/23</a:t>
             </a:fld>
             <a:endParaRPr lang="en-US"/>
           </a:p>
@@ -1838,7 +2798,7 @@
           <a:p>
             <a:fld id="{46878720-212C-42BB-B356-99628BFE1EBF}" type="datetimeFigureOut">
               <a:rPr lang="en-US" smtClean="0"/>
-              <a:t>3/16/22</a:t>
+              <a:t>3/5/23</a:t>
             </a:fld>
             <a:endParaRPr lang="en-US"/>
           </a:p>
@@ -2036,7 +2996,7 @@
           <a:p>
             <a:fld id="{46878720-212C-42BB-B356-99628BFE1EBF}" type="datetimeFigureOut">
               <a:rPr lang="en-US" smtClean="0"/>
-              <a:t>3/16/22</a:t>
+              <a:t>3/5/23</a:t>
             </a:fld>
             <a:endParaRPr lang="en-US"/>
           </a:p>
@@ -2311,7 +3271,7 @@
           <a:p>
             <a:fld id="{46878720-212C-42BB-B356-99628BFE1EBF}" type="datetimeFigureOut">
               <a:rPr lang="en-US" smtClean="0"/>
-              <a:t>3/16/22</a:t>
+              <a:t>3/5/23</a:t>
             </a:fld>
             <a:endParaRPr lang="en-US"/>
           </a:p>
@@ -2576,7 +3536,7 @@
           <a:p>
             <a:fld id="{46878720-212C-42BB-B356-99628BFE1EBF}" type="datetimeFigureOut">
               <a:rPr lang="en-US" smtClean="0"/>
-              <a:t>3/16/22</a:t>
+              <a:t>3/5/23</a:t>
             </a:fld>
             <a:endParaRPr lang="en-US"/>
           </a:p>
@@ -2988,7 +3948,7 @@
           <a:p>
             <a:fld id="{46878720-212C-42BB-B356-99628BFE1EBF}" type="datetimeFigureOut">
               <a:rPr lang="en-US" smtClean="0"/>
-              <a:t>3/16/22</a:t>
+              <a:t>3/5/23</a:t>
             </a:fld>
             <a:endParaRPr lang="en-US"/>
           </a:p>
@@ -3129,7 +4089,7 @@
           <a:p>
             <a:fld id="{46878720-212C-42BB-B356-99628BFE1EBF}" type="datetimeFigureOut">
               <a:rPr lang="en-US" smtClean="0"/>
-              <a:t>3/16/22</a:t>
+              <a:t>3/5/23</a:t>
             </a:fld>
             <a:endParaRPr lang="en-US"/>
           </a:p>
@@ -3242,7 +4202,7 @@
           <a:p>
             <a:fld id="{46878720-212C-42BB-B356-99628BFE1EBF}" type="datetimeFigureOut">
               <a:rPr lang="en-US" smtClean="0"/>
-              <a:t>3/16/22</a:t>
+              <a:t>3/5/23</a:t>
             </a:fld>
             <a:endParaRPr lang="en-US"/>
           </a:p>
@@ -3553,7 +4513,7 @@
           <a:p>
             <a:fld id="{46878720-212C-42BB-B356-99628BFE1EBF}" type="datetimeFigureOut">
               <a:rPr lang="en-US" smtClean="0"/>
-              <a:t>3/16/22</a:t>
+              <a:t>3/5/23</a:t>
             </a:fld>
             <a:endParaRPr lang="en-US"/>
           </a:p>
@@ -3841,7 +4801,7 @@
           <a:p>
             <a:fld id="{46878720-212C-42BB-B356-99628BFE1EBF}" type="datetimeFigureOut">
               <a:rPr lang="en-US" smtClean="0"/>
-              <a:t>3/16/22</a:t>
+              <a:t>3/5/23</a:t>
             </a:fld>
             <a:endParaRPr lang="en-US"/>
           </a:p>
@@ -4082,7 +5042,7 @@
           <a:p>
             <a:fld id="{46878720-212C-42BB-B356-99628BFE1EBF}" type="datetimeFigureOut">
               <a:rPr lang="en-US" smtClean="0"/>
-              <a:t>3/16/22</a:t>
+              <a:t>3/5/23</a:t>
             </a:fld>
             <a:endParaRPr lang="en-US"/>
           </a:p>
@@ -4953,6 +5913,365 @@
 </p:sld>
 </file>
 
+<file path=ppt/slides/slide10.xml><?xml version="1.0" encoding="utf-8"?>
+<p:sld xmlns:a="http://schemas.openxmlformats.org/drawingml/2006/main" xmlns:r="http://schemas.openxmlformats.org/officeDocument/2006/relationships" xmlns:p="http://schemas.openxmlformats.org/presentationml/2006/main">
+  <p:cSld>
+    <p:spTree>
+      <p:nvGrpSpPr>
+        <p:cNvPr id="1" name=""/>
+        <p:cNvGrpSpPr/>
+        <p:nvPr/>
+      </p:nvGrpSpPr>
+      <p:grpSpPr>
+        <a:xfrm>
+          <a:off x="0" y="0"/>
+          <a:ext cx="0" cy="0"/>
+          <a:chOff x="0" y="0"/>
+          <a:chExt cx="0" cy="0"/>
+        </a:xfrm>
+      </p:grpSpPr>
+      <p:sp>
+        <p:nvSpPr>
+          <p:cNvPr id="2" name="Titel 1">
+            <a:extLst>
+              <a:ext uri="{FF2B5EF4-FFF2-40B4-BE49-F238E27FC236}">
+                <a16:creationId xmlns:a16="http://schemas.microsoft.com/office/drawing/2014/main" id="{392D7D64-17FB-444B-B0FC-332B8A749537}"/>
+              </a:ext>
+            </a:extLst>
+          </p:cNvPr>
+          <p:cNvSpPr>
+            <a:spLocks noGrp="1"/>
+          </p:cNvSpPr>
+          <p:nvPr>
+            <p:ph type="title"/>
+          </p:nvPr>
+        </p:nvSpPr>
+        <p:spPr/>
+        <p:txBody>
+          <a:bodyPr/>
+          <a:lstStyle/>
+          <a:p>
+            <a:r>
+              <a:rPr lang="de-DE" dirty="0" err="1"/>
+              <a:t>Arduino</a:t>
+            </a:r>
+            <a:r>
+              <a:rPr lang="de-DE" dirty="0"/>
+              <a:t> IDE 2.0 Debugging</a:t>
+            </a:r>
+          </a:p>
+        </p:txBody>
+      </p:sp>
+      <p:sp>
+        <p:nvSpPr>
+          <p:cNvPr id="4" name="Inhaltsplatzhalter 3">
+            <a:extLst>
+              <a:ext uri="{FF2B5EF4-FFF2-40B4-BE49-F238E27FC236}">
+                <a16:creationId xmlns:a16="http://schemas.microsoft.com/office/drawing/2014/main" id="{1D6E604F-B399-C249-A541-F9EDFDF20534}"/>
+              </a:ext>
+            </a:extLst>
+          </p:cNvPr>
+          <p:cNvSpPr>
+            <a:spLocks noGrp="1"/>
+          </p:cNvSpPr>
+          <p:nvPr>
+            <p:ph idx="1"/>
+          </p:nvPr>
+        </p:nvSpPr>
+        <p:spPr/>
+        <p:txBody>
+          <a:bodyPr/>
+          <a:lstStyle/>
+          <a:p>
+            <a:r>
+              <a:rPr lang="de-DE" dirty="0">
+                <a:hlinkClick r:id="rId3"/>
+              </a:rPr>
+              <a:t>https://docs.arduino.cc/software/ide-v2/tutorials/ide-v2-debugger</a:t>
+            </a:r>
+            <a:endParaRPr lang="de-DE" dirty="0"/>
+          </a:p>
+          <a:p>
+            <a:r>
+              <a:rPr lang="de-DE" dirty="0"/>
+              <a:t>Nur mit manchen Boards unterstützt (SAMD MKR Boards wie MKR Zero)</a:t>
+            </a:r>
+          </a:p>
+        </p:txBody>
+      </p:sp>
+    </p:spTree>
+    <p:extLst>
+      <p:ext uri="{BB962C8B-B14F-4D97-AF65-F5344CB8AC3E}">
+        <p14:creationId xmlns:p14="http://schemas.microsoft.com/office/powerpoint/2010/main" val="1352385898"/>
+      </p:ext>
+    </p:extLst>
+  </p:cSld>
+  <p:clrMapOvr>
+    <a:masterClrMapping/>
+  </p:clrMapOvr>
+</p:sld>
+</file>
+
+<file path=ppt/slides/slide11.xml><?xml version="1.0" encoding="utf-8"?>
+<p:sld xmlns:a="http://schemas.openxmlformats.org/drawingml/2006/main" xmlns:r="http://schemas.openxmlformats.org/officeDocument/2006/relationships" xmlns:p="http://schemas.openxmlformats.org/presentationml/2006/main">
+  <p:cSld>
+    <p:spTree>
+      <p:nvGrpSpPr>
+        <p:cNvPr id="1" name=""/>
+        <p:cNvGrpSpPr/>
+        <p:nvPr/>
+      </p:nvGrpSpPr>
+      <p:grpSpPr>
+        <a:xfrm>
+          <a:off x="0" y="0"/>
+          <a:ext cx="0" cy="0"/>
+          <a:chOff x="0" y="0"/>
+          <a:chExt cx="0" cy="0"/>
+        </a:xfrm>
+      </p:grpSpPr>
+      <p:pic>
+        <p:nvPicPr>
+          <p:cNvPr id="1026" name="Picture 2" descr="Going between breakpoints.">
+            <a:extLst>
+              <a:ext uri="{FF2B5EF4-FFF2-40B4-BE49-F238E27FC236}">
+                <a16:creationId xmlns:a16="http://schemas.microsoft.com/office/drawing/2014/main" id="{C0B75F9A-864D-BC4E-945C-745D614047B6}"/>
+              </a:ext>
+            </a:extLst>
+          </p:cNvPr>
+          <p:cNvPicPr>
+            <a:picLocks noChangeAspect="1" noChangeArrowheads="1"/>
+          </p:cNvPicPr>
+          <p:nvPr/>
+        </p:nvPicPr>
+        <p:blipFill>
+          <a:blip r:embed="rId3">
+            <a:extLst>
+              <a:ext uri="{28A0092B-C50C-407E-A947-70E740481C1C}">
+                <a14:useLocalDpi xmlns:a14="http://schemas.microsoft.com/office/drawing/2010/main" val="0"/>
+              </a:ext>
+            </a:extLst>
+          </a:blip>
+          <a:srcRect/>
+          <a:stretch>
+            <a:fillRect/>
+          </a:stretch>
+        </p:blipFill>
+        <p:spPr bwMode="auto">
+          <a:xfrm>
+            <a:off x="1639888" y="0"/>
+            <a:ext cx="8912225" cy="6858000"/>
+          </a:xfrm>
+          <a:prstGeom prst="rect">
+            <a:avLst/>
+          </a:prstGeom>
+          <a:noFill/>
+          <a:extLst>
+            <a:ext uri="{909E8E84-426E-40DD-AFC4-6F175D3DCCD1}">
+              <a14:hiddenFill xmlns:a14="http://schemas.microsoft.com/office/drawing/2010/main">
+                <a:solidFill>
+                  <a:srgbClr val="FFFFFF"/>
+                </a:solidFill>
+              </a14:hiddenFill>
+            </a:ext>
+          </a:extLst>
+        </p:spPr>
+      </p:pic>
+    </p:spTree>
+    <p:extLst>
+      <p:ext uri="{BB962C8B-B14F-4D97-AF65-F5344CB8AC3E}">
+        <p14:creationId xmlns:p14="http://schemas.microsoft.com/office/powerpoint/2010/main" val="1029990919"/>
+      </p:ext>
+    </p:extLst>
+  </p:cSld>
+  <p:clrMapOvr>
+    <a:masterClrMapping/>
+  </p:clrMapOvr>
+</p:sld>
+</file>
+
+<file path=ppt/slides/slide12.xml><?xml version="1.0" encoding="utf-8"?>
+<p:sld xmlns:a="http://schemas.openxmlformats.org/drawingml/2006/main" xmlns:r="http://schemas.openxmlformats.org/officeDocument/2006/relationships" xmlns:p="http://schemas.openxmlformats.org/presentationml/2006/main">
+  <p:cSld>
+    <p:spTree>
+      <p:nvGrpSpPr>
+        <p:cNvPr id="1" name=""/>
+        <p:cNvGrpSpPr/>
+        <p:nvPr/>
+      </p:nvGrpSpPr>
+      <p:grpSpPr>
+        <a:xfrm>
+          <a:off x="0" y="0"/>
+          <a:ext cx="0" cy="0"/>
+          <a:chOff x="0" y="0"/>
+          <a:chExt cx="0" cy="0"/>
+        </a:xfrm>
+      </p:grpSpPr>
+      <p:sp>
+        <p:nvSpPr>
+          <p:cNvPr id="2" name="Titel 1">
+            <a:extLst>
+              <a:ext uri="{FF2B5EF4-FFF2-40B4-BE49-F238E27FC236}">
+                <a16:creationId xmlns:a16="http://schemas.microsoft.com/office/drawing/2014/main" id="{334936CD-7D3C-B341-9FFC-2AF7C2C2928F}"/>
+              </a:ext>
+            </a:extLst>
+          </p:cNvPr>
+          <p:cNvSpPr>
+            <a:spLocks noGrp="1"/>
+          </p:cNvSpPr>
+          <p:nvPr>
+            <p:ph type="title"/>
+          </p:nvPr>
+        </p:nvSpPr>
+        <p:spPr/>
+        <p:txBody>
+          <a:bodyPr/>
+          <a:lstStyle/>
+          <a:p>
+            <a:r>
+              <a:rPr lang="de-DE" dirty="0"/>
+              <a:t>Attribution und Quellen</a:t>
+            </a:r>
+          </a:p>
+        </p:txBody>
+      </p:sp>
+      <p:sp>
+        <p:nvSpPr>
+          <p:cNvPr id="3" name="Textplatzhalter 2">
+            <a:extLst>
+              <a:ext uri="{FF2B5EF4-FFF2-40B4-BE49-F238E27FC236}">
+                <a16:creationId xmlns:a16="http://schemas.microsoft.com/office/drawing/2014/main" id="{DEF89A04-C556-384F-8F4C-62B2495131C1}"/>
+              </a:ext>
+            </a:extLst>
+          </p:cNvPr>
+          <p:cNvSpPr>
+            <a:spLocks noGrp="1"/>
+          </p:cNvSpPr>
+          <p:nvPr>
+            <p:ph type="body" idx="1"/>
+          </p:nvPr>
+        </p:nvSpPr>
+        <p:spPr/>
+        <p:txBody>
+          <a:bodyPr>
+            <a:normAutofit fontScale="47500" lnSpcReduction="20000"/>
+          </a:bodyPr>
+          <a:lstStyle/>
+          <a:p>
+            <a:r>
+              <a:rPr lang="de-DE" dirty="0"/>
+              <a:t>Diese Folien wurden von Peter </a:t>
+            </a:r>
+            <a:r>
+              <a:rPr lang="de-DE" dirty="0" err="1"/>
+              <a:t>Bendel</a:t>
+            </a:r>
+            <a:r>
+              <a:rPr lang="de-DE" dirty="0"/>
+              <a:t> erstellt.</a:t>
+            </a:r>
+          </a:p>
+          <a:p>
+            <a:r>
+              <a:rPr lang="de-DE" dirty="0"/>
+              <a:t>Für diese Folien gilt die </a:t>
+            </a:r>
+            <a:r>
+              <a:rPr lang="de-DE" b="1" dirty="0"/>
+              <a:t>Attribution-</a:t>
+            </a:r>
+            <a:r>
+              <a:rPr lang="de-DE" b="1" dirty="0" err="1"/>
+              <a:t>ShareAlike</a:t>
+            </a:r>
+            <a:r>
+              <a:rPr lang="de-DE" b="1" dirty="0"/>
+              <a:t> 3.0 </a:t>
+            </a:r>
+            <a:r>
+              <a:rPr lang="de-DE" b="1" dirty="0" err="1"/>
+              <a:t>Unported</a:t>
+            </a:r>
+            <a:endParaRPr lang="de-DE" b="1" dirty="0"/>
+          </a:p>
+          <a:p>
+            <a:r>
+              <a:rPr lang="de-DE" dirty="0"/>
+              <a:t> Lizenz, </a:t>
+            </a:r>
+            <a:r>
+              <a:rPr lang="de-DE" dirty="0">
+                <a:hlinkClick r:id="rId3"/>
+              </a:rPr>
+              <a:t>https://creativecommons.org/licenses/by-sa/3.0/</a:t>
+            </a:r>
+            <a:endParaRPr lang="de-DE" dirty="0"/>
+          </a:p>
+          <a:p>
+            <a:r>
+              <a:rPr lang="de-DE" dirty="0"/>
+              <a:t>Quellen: </a:t>
+            </a:r>
+          </a:p>
+          <a:p>
+            <a:r>
+              <a:rPr lang="de-DE" dirty="0">
+                <a:hlinkClick r:id="rId4"/>
+              </a:rPr>
+              <a:t>https://docs.arduino.cc/software/ide-v2/tutorials/ide-v2-debugger</a:t>
+            </a:r>
+            <a:endParaRPr lang="de-DE" dirty="0"/>
+          </a:p>
+          <a:p>
+            <a:r>
+              <a:rPr lang="de-DE" dirty="0"/>
+              <a:t>https://</a:t>
+            </a:r>
+            <a:r>
+              <a:rPr lang="de-DE" dirty="0" err="1"/>
+              <a:t>github.com</a:t>
+            </a:r>
+            <a:r>
+              <a:rPr lang="de-DE" dirty="0"/>
+              <a:t>/</a:t>
+            </a:r>
+            <a:r>
+              <a:rPr lang="de-DE" dirty="0" err="1"/>
+              <a:t>liffiton</a:t>
+            </a:r>
+            <a:r>
+              <a:rPr lang="de-DE" dirty="0"/>
+              <a:t>/</a:t>
+            </a:r>
+            <a:r>
+              <a:rPr lang="de-DE" dirty="0" err="1"/>
+              <a:t>Arduino</a:t>
+            </a:r>
+            <a:r>
+              <a:rPr lang="de-DE" dirty="0"/>
+              <a:t>-Cheat-Sheet</a:t>
+            </a:r>
+          </a:p>
+          <a:p>
+            <a:endParaRPr lang="de-DE" dirty="0"/>
+          </a:p>
+          <a:p>
+            <a:endParaRPr lang="de-DE" dirty="0"/>
+          </a:p>
+        </p:txBody>
+      </p:sp>
+    </p:spTree>
+    <p:extLst>
+      <p:ext uri="{BB962C8B-B14F-4D97-AF65-F5344CB8AC3E}">
+        <p14:creationId xmlns:p14="http://schemas.microsoft.com/office/powerpoint/2010/main" val="3103116398"/>
+      </p:ext>
+    </p:extLst>
+  </p:cSld>
+  <p:clrMapOvr>
+    <a:masterClrMapping/>
+  </p:clrMapOvr>
+</p:sld>
+</file>
+
 <file path=ppt/slides/slide2.xml><?xml version="1.0" encoding="utf-8"?>
 <p:sld xmlns:a="http://schemas.openxmlformats.org/drawingml/2006/main" xmlns:r="http://schemas.openxmlformats.org/officeDocument/2006/relationships" xmlns:p="http://schemas.openxmlformats.org/presentationml/2006/main">
   <p:cSld>
@@ -5117,7 +6436,7 @@
           <p:nvPr/>
         </p:nvPicPr>
         <p:blipFill>
-          <a:blip r:embed="rId2"/>
+          <a:blip r:embed="rId3"/>
           <a:stretch>
             <a:fillRect/>
           </a:stretch>
@@ -5147,7 +6466,7 @@
           <p:nvPr/>
         </p:nvPicPr>
         <p:blipFill>
-          <a:blip r:embed="rId3"/>
+          <a:blip r:embed="rId4"/>
           <a:stretch>
             <a:fillRect/>
           </a:stretch>
@@ -5227,7 +6546,7 @@
           <p:nvPr/>
         </p:nvPicPr>
         <p:blipFill>
-          <a:blip r:embed="rId4"/>
+          <a:blip r:embed="rId5"/>
           <a:stretch>
             <a:fillRect/>
           </a:stretch>
@@ -5337,7 +6656,7 @@
           <p:nvPr/>
         </p:nvPicPr>
         <p:blipFill>
-          <a:blip r:embed="rId2"/>
+          <a:blip r:embed="rId3"/>
           <a:stretch>
             <a:fillRect/>
           </a:stretch>
@@ -5367,7 +6686,7 @@
           <p:nvPr/>
         </p:nvPicPr>
         <p:blipFill>
-          <a:blip r:embed="rId3"/>
+          <a:blip r:embed="rId4"/>
           <a:stretch>
             <a:fillRect/>
           </a:stretch>
@@ -5384,7 +6703,7 @@
       </p:pic>
       <mc:AlternateContent xmlns:mc="http://schemas.openxmlformats.org/markup-compatibility/2006" xmlns:p14="http://schemas.microsoft.com/office/powerpoint/2010/main">
         <mc:Choice Requires="p14">
-          <p:contentPart p14:bwMode="auto" r:id="rId4">
+          <p:contentPart p14:bwMode="auto" r:id="rId5">
             <p14:nvContentPartPr>
               <p14:cNvPr id="4" name="Freihand 3">
                 <a:extLst>
@@ -5416,7 +6735,7 @@
               <p:nvPr/>
             </p:nvPicPr>
             <p:blipFill>
-              <a:blip r:embed="rId5"/>
+              <a:blip r:embed="rId6"/>
               <a:stretch>
                 <a:fillRect/>
               </a:stretch>
@@ -5435,7 +6754,7 @@
       </mc:AlternateContent>
       <mc:AlternateContent xmlns:mc="http://schemas.openxmlformats.org/markup-compatibility/2006" xmlns:p14="http://schemas.microsoft.com/office/powerpoint/2010/main">
         <mc:Choice Requires="p14">
-          <p:contentPart p14:bwMode="auto" r:id="rId6">
+          <p:contentPart p14:bwMode="auto" r:id="rId7">
             <p14:nvContentPartPr>
               <p14:cNvPr id="5" name="Freihand 4">
                 <a:extLst>
@@ -5467,7 +6786,7 @@
               <p:nvPr/>
             </p:nvPicPr>
             <p:blipFill>
-              <a:blip r:embed="rId7"/>
+              <a:blip r:embed="rId8"/>
               <a:stretch>
                 <a:fillRect/>
               </a:stretch>
@@ -5626,7 +6945,7 @@
         </p:grpSpPr>
         <mc:AlternateContent xmlns:mc="http://schemas.openxmlformats.org/markup-compatibility/2006" xmlns:p14="http://schemas.microsoft.com/office/powerpoint/2010/main">
           <mc:Choice Requires="p14">
-            <p:contentPart p14:bwMode="auto" r:id="rId8">
+            <p:contentPart p14:bwMode="auto" r:id="rId9">
               <p14:nvContentPartPr>
                 <p14:cNvPr id="10" name="Freihand 9">
                   <a:extLst>
@@ -5658,7 +6977,7 @@
                 <p:nvPr/>
               </p:nvPicPr>
               <p:blipFill>
-                <a:blip r:embed="rId9"/>
+                <a:blip r:embed="rId10"/>
                 <a:stretch>
                   <a:fillRect/>
                 </a:stretch>
@@ -5677,7 +6996,7 @@
         </mc:AlternateContent>
         <mc:AlternateContent xmlns:mc="http://schemas.openxmlformats.org/markup-compatibility/2006" xmlns:p14="http://schemas.microsoft.com/office/powerpoint/2010/main">
           <mc:Choice Requires="p14">
-            <p:contentPart p14:bwMode="auto" r:id="rId10">
+            <p:contentPart p14:bwMode="auto" r:id="rId11">
               <p14:nvContentPartPr>
                 <p14:cNvPr id="11" name="Freihand 10">
                   <a:extLst>
@@ -5709,7 +7028,7 @@
                 <p:nvPr/>
               </p:nvPicPr>
               <p:blipFill>
-                <a:blip r:embed="rId11"/>
+                <a:blip r:embed="rId12"/>
                 <a:stretch>
                   <a:fillRect/>
                 </a:stretch>
@@ -5728,7 +7047,7 @@
         </mc:AlternateContent>
         <mc:AlternateContent xmlns:mc="http://schemas.openxmlformats.org/markup-compatibility/2006" xmlns:p14="http://schemas.microsoft.com/office/powerpoint/2010/main">
           <mc:Choice Requires="p14">
-            <p:contentPart p14:bwMode="auto" r:id="rId12">
+            <p:contentPart p14:bwMode="auto" r:id="rId13">
               <p14:nvContentPartPr>
                 <p14:cNvPr id="13" name="Freihand 12">
                   <a:extLst>
@@ -5760,7 +7079,7 @@
                 <p:nvPr/>
               </p:nvPicPr>
               <p:blipFill>
-                <a:blip r:embed="rId13"/>
+                <a:blip r:embed="rId14"/>
                 <a:stretch>
                   <a:fillRect/>
                 </a:stretch>
@@ -5800,7 +7119,7 @@
         </p:grpSpPr>
         <mc:AlternateContent xmlns:mc="http://schemas.openxmlformats.org/markup-compatibility/2006" xmlns:p14="http://schemas.microsoft.com/office/powerpoint/2010/main">
           <mc:Choice Requires="p14">
-            <p:contentPart p14:bwMode="auto" r:id="rId14">
+            <p:contentPart p14:bwMode="auto" r:id="rId15">
               <p14:nvContentPartPr>
                 <p14:cNvPr id="15" name="Freihand 14">
                   <a:extLst>
@@ -5832,7 +7151,7 @@
                 <p:nvPr/>
               </p:nvPicPr>
               <p:blipFill>
-                <a:blip r:embed="rId15"/>
+                <a:blip r:embed="rId16"/>
                 <a:stretch>
                   <a:fillRect/>
                 </a:stretch>
@@ -5851,7 +7170,7 @@
         </mc:AlternateContent>
         <mc:AlternateContent xmlns:mc="http://schemas.openxmlformats.org/markup-compatibility/2006" xmlns:p14="http://schemas.microsoft.com/office/powerpoint/2010/main">
           <mc:Choice Requires="p14">
-            <p:contentPart p14:bwMode="auto" r:id="rId16">
+            <p:contentPart p14:bwMode="auto" r:id="rId17">
               <p14:nvContentPartPr>
                 <p14:cNvPr id="16" name="Freihand 15">
                   <a:extLst>
@@ -5883,7 +7202,7 @@
                 <p:nvPr/>
               </p:nvPicPr>
               <p:blipFill>
-                <a:blip r:embed="rId17"/>
+                <a:blip r:embed="rId18"/>
                 <a:stretch>
                   <a:fillRect/>
                 </a:stretch>
@@ -5903,7 +7222,7 @@
       </p:grpSp>
       <mc:AlternateContent xmlns:mc="http://schemas.openxmlformats.org/markup-compatibility/2006" xmlns:p14="http://schemas.microsoft.com/office/powerpoint/2010/main">
         <mc:Choice Requires="p14">
-          <p:contentPart p14:bwMode="auto" r:id="rId18">
+          <p:contentPart p14:bwMode="auto" r:id="rId19">
             <p14:nvContentPartPr>
               <p14:cNvPr id="18" name="Freihand 17">
                 <a:extLst>
@@ -5935,7 +7254,7 @@
               <p:nvPr/>
             </p:nvPicPr>
             <p:blipFill>
-              <a:blip r:embed="rId19"/>
+              <a:blip r:embed="rId20"/>
               <a:stretch>
                 <a:fillRect/>
               </a:stretch>
@@ -5974,7 +7293,7 @@
         </p:grpSpPr>
         <mc:AlternateContent xmlns:mc="http://schemas.openxmlformats.org/markup-compatibility/2006" xmlns:p14="http://schemas.microsoft.com/office/powerpoint/2010/main">
           <mc:Choice Requires="p14">
-            <p:contentPart p14:bwMode="auto" r:id="rId20">
+            <p:contentPart p14:bwMode="auto" r:id="rId21">
               <p14:nvContentPartPr>
                 <p14:cNvPr id="19" name="Freihand 18">
                   <a:extLst>
@@ -6006,7 +7325,7 @@
                 <p:nvPr/>
               </p:nvPicPr>
               <p:blipFill>
-                <a:blip r:embed="rId21"/>
+                <a:blip r:embed="rId22"/>
                 <a:stretch>
                   <a:fillRect/>
                 </a:stretch>
@@ -6025,7 +7344,7 @@
         </mc:AlternateContent>
         <mc:AlternateContent xmlns:mc="http://schemas.openxmlformats.org/markup-compatibility/2006" xmlns:p14="http://schemas.microsoft.com/office/powerpoint/2010/main">
           <mc:Choice Requires="p14">
-            <p:contentPart p14:bwMode="auto" r:id="rId22">
+            <p:contentPart p14:bwMode="auto" r:id="rId23">
               <p14:nvContentPartPr>
                 <p14:cNvPr id="20" name="Freihand 19">
                   <a:extLst>
@@ -6057,7 +7376,7 @@
                 <p:nvPr/>
               </p:nvPicPr>
               <p:blipFill>
-                <a:blip r:embed="rId23"/>
+                <a:blip r:embed="rId24"/>
                 <a:stretch>
                   <a:fillRect/>
                 </a:stretch>
@@ -6076,7 +7395,7 @@
         </mc:AlternateContent>
         <mc:AlternateContent xmlns:mc="http://schemas.openxmlformats.org/markup-compatibility/2006" xmlns:p14="http://schemas.microsoft.com/office/powerpoint/2010/main">
           <mc:Choice Requires="p14">
-            <p:contentPart p14:bwMode="auto" r:id="rId24">
+            <p:contentPart p14:bwMode="auto" r:id="rId25">
               <p14:nvContentPartPr>
                 <p14:cNvPr id="21" name="Freihand 20">
                   <a:extLst>
@@ -6108,7 +7427,7 @@
                 <p:nvPr/>
               </p:nvPicPr>
               <p:blipFill>
-                <a:blip r:embed="rId25"/>
+                <a:blip r:embed="rId26"/>
                 <a:stretch>
                   <a:fillRect/>
                 </a:stretch>
@@ -6148,7 +7467,7 @@
         </p:grpSpPr>
         <mc:AlternateContent xmlns:mc="http://schemas.openxmlformats.org/markup-compatibility/2006" xmlns:p14="http://schemas.microsoft.com/office/powerpoint/2010/main">
           <mc:Choice Requires="p14">
-            <p:contentPart p14:bwMode="auto" r:id="rId26">
+            <p:contentPart p14:bwMode="auto" r:id="rId27">
               <p14:nvContentPartPr>
                 <p14:cNvPr id="23" name="Freihand 22">
                   <a:extLst>
@@ -6180,7 +7499,7 @@
                 <p:nvPr/>
               </p:nvPicPr>
               <p:blipFill>
-                <a:blip r:embed="rId27"/>
+                <a:blip r:embed="rId28"/>
                 <a:stretch>
                   <a:fillRect/>
                 </a:stretch>
@@ -6199,7 +7518,7 @@
         </mc:AlternateContent>
         <mc:AlternateContent xmlns:mc="http://schemas.openxmlformats.org/markup-compatibility/2006" xmlns:p14="http://schemas.microsoft.com/office/powerpoint/2010/main">
           <mc:Choice Requires="p14">
-            <p:contentPart p14:bwMode="auto" r:id="rId28">
+            <p:contentPart p14:bwMode="auto" r:id="rId29">
               <p14:nvContentPartPr>
                 <p14:cNvPr id="24" name="Freihand 23">
                   <a:extLst>
@@ -6231,7 +7550,7 @@
                 <p:nvPr/>
               </p:nvPicPr>
               <p:blipFill>
-                <a:blip r:embed="rId29"/>
+                <a:blip r:embed="rId30"/>
                 <a:stretch>
                   <a:fillRect/>
                 </a:stretch>
@@ -6250,7 +7569,7 @@
         </mc:AlternateContent>
         <mc:AlternateContent xmlns:mc="http://schemas.openxmlformats.org/markup-compatibility/2006" xmlns:p14="http://schemas.microsoft.com/office/powerpoint/2010/main">
           <mc:Choice Requires="p14">
-            <p:contentPart p14:bwMode="auto" r:id="rId30">
+            <p:contentPart p14:bwMode="auto" r:id="rId31">
               <p14:nvContentPartPr>
                 <p14:cNvPr id="25" name="Freihand 24">
                   <a:extLst>
@@ -6282,7 +7601,7 @@
                 <p:nvPr/>
               </p:nvPicPr>
               <p:blipFill>
-                <a:blip r:embed="rId31"/>
+                <a:blip r:embed="rId32"/>
                 <a:stretch>
                   <a:fillRect/>
                 </a:stretch>
@@ -6315,7 +7634,7 @@
           <p:nvPr/>
         </p:nvPicPr>
         <p:blipFill>
-          <a:blip r:embed="rId32"/>
+          <a:blip r:embed="rId33"/>
           <a:stretch>
             <a:fillRect/>
           </a:stretch>
@@ -6437,7 +7756,7 @@
         </p:grpSpPr>
         <mc:AlternateContent xmlns:mc="http://schemas.openxmlformats.org/markup-compatibility/2006" xmlns:p14="http://schemas.microsoft.com/office/powerpoint/2010/main">
           <mc:Choice Requires="p14">
-            <p:contentPart p14:bwMode="auto" r:id="rId33">
+            <p:contentPart p14:bwMode="auto" r:id="rId34">
               <p14:nvContentPartPr>
                 <p14:cNvPr id="30" name="Freihand 29">
                   <a:extLst>
@@ -6469,7 +7788,7 @@
                 <p:nvPr/>
               </p:nvPicPr>
               <p:blipFill>
-                <a:blip r:embed="rId34"/>
+                <a:blip r:embed="rId35"/>
                 <a:stretch>
                   <a:fillRect/>
                 </a:stretch>
@@ -6488,7 +7807,7 @@
         </mc:AlternateContent>
         <mc:AlternateContent xmlns:mc="http://schemas.openxmlformats.org/markup-compatibility/2006" xmlns:p14="http://schemas.microsoft.com/office/powerpoint/2010/main">
           <mc:Choice Requires="p14">
-            <p:contentPart p14:bwMode="auto" r:id="rId35">
+            <p:contentPart p14:bwMode="auto" r:id="rId36">
               <p14:nvContentPartPr>
                 <p14:cNvPr id="31" name="Freihand 30">
                   <a:extLst>
@@ -6520,7 +7839,7 @@
                 <p:nvPr/>
               </p:nvPicPr>
               <p:blipFill>
-                <a:blip r:embed="rId36"/>
+                <a:blip r:embed="rId37"/>
                 <a:stretch>
                   <a:fillRect/>
                 </a:stretch>
@@ -6611,7 +7930,7 @@
           <p:nvPr/>
         </p:nvPicPr>
         <p:blipFill>
-          <a:blip r:embed="rId2"/>
+          <a:blip r:embed="rId3"/>
           <a:stretch>
             <a:fillRect/>
           </a:stretch>
@@ -6655,79 +7974,79 @@
           <a:p>
             <a:r>
               <a:rPr lang="de-DE" dirty="0">
-                <a:hlinkClick r:id="rId3"/>
+                <a:hlinkClick r:id="rId4"/>
               </a:rPr>
               <a:t>https://</a:t>
             </a:r>
             <a:r>
               <a:rPr lang="de-DE" dirty="0" err="1">
-                <a:hlinkClick r:id="rId3"/>
+                <a:hlinkClick r:id="rId4"/>
               </a:rPr>
               <a:t>www.arduino.cc</a:t>
             </a:r>
             <a:r>
               <a:rPr lang="de-DE" dirty="0">
-                <a:hlinkClick r:id="rId3"/>
+                <a:hlinkClick r:id="rId4"/>
               </a:rPr>
               <a:t>/</a:t>
             </a:r>
             <a:r>
               <a:rPr lang="de-DE" dirty="0" err="1">
-                <a:hlinkClick r:id="rId3"/>
+                <a:hlinkClick r:id="rId4"/>
               </a:rPr>
               <a:t>reference</a:t>
             </a:r>
             <a:r>
               <a:rPr lang="de-DE" dirty="0">
-                <a:hlinkClick r:id="rId3"/>
+                <a:hlinkClick r:id="rId4"/>
               </a:rPr>
               <a:t>/en/</a:t>
             </a:r>
             <a:r>
               <a:rPr lang="de-DE" dirty="0" err="1">
-                <a:hlinkClick r:id="rId3"/>
+                <a:hlinkClick r:id="rId4"/>
               </a:rPr>
               <a:t>language</a:t>
             </a:r>
             <a:r>
               <a:rPr lang="de-DE" dirty="0">
-                <a:hlinkClick r:id="rId3"/>
+                <a:hlinkClick r:id="rId4"/>
               </a:rPr>
               <a:t>/</a:t>
             </a:r>
             <a:r>
               <a:rPr lang="de-DE" dirty="0" err="1">
-                <a:hlinkClick r:id="rId3"/>
+                <a:hlinkClick r:id="rId4"/>
               </a:rPr>
               <a:t>functions</a:t>
             </a:r>
             <a:r>
               <a:rPr lang="de-DE" dirty="0">
-                <a:hlinkClick r:id="rId3"/>
+                <a:hlinkClick r:id="rId4"/>
               </a:rPr>
               <a:t>/</a:t>
             </a:r>
             <a:r>
               <a:rPr lang="de-DE" dirty="0" err="1">
-                <a:hlinkClick r:id="rId3"/>
+                <a:hlinkClick r:id="rId4"/>
               </a:rPr>
               <a:t>communication</a:t>
             </a:r>
             <a:r>
               <a:rPr lang="de-DE" dirty="0">
-                <a:hlinkClick r:id="rId3"/>
+                <a:hlinkClick r:id="rId4"/>
               </a:rPr>
               <a:t>/</a:t>
             </a:r>
             <a:r>
               <a:rPr lang="de-DE" dirty="0" err="1">
-                <a:hlinkClick r:id="rId3"/>
+                <a:hlinkClick r:id="rId4"/>
               </a:rPr>
               <a:t>serial</a:t>
             </a:r>
             <a:r>
               <a:rPr lang="de-DE" dirty="0">
-                <a:hlinkClick r:id="rId3"/>
+                <a:hlinkClick r:id="rId4"/>
               </a:rPr>
               <a:t>/</a:t>
             </a:r>
@@ -6770,6 +8089,354 @@
           <p:cNvPr id="2" name="Titel 1">
             <a:extLst>
               <a:ext uri="{FF2B5EF4-FFF2-40B4-BE49-F238E27FC236}">
+                <a16:creationId xmlns:a16="http://schemas.microsoft.com/office/drawing/2014/main" id="{FBE6855B-367A-2844-324C-FD0C7A338690}"/>
+              </a:ext>
+            </a:extLst>
+          </p:cNvPr>
+          <p:cNvSpPr>
+            <a:spLocks noGrp="1"/>
+          </p:cNvSpPr>
+          <p:nvPr>
+            <p:ph type="ctrTitle"/>
+          </p:nvPr>
+        </p:nvSpPr>
+        <p:spPr/>
+        <p:txBody>
+          <a:bodyPr/>
+          <a:lstStyle/>
+          <a:p>
+            <a:endParaRPr lang="de-DE"/>
+          </a:p>
+        </p:txBody>
+      </p:sp>
+      <p:sp>
+        <p:nvSpPr>
+          <p:cNvPr id="3" name="Untertitel 2">
+            <a:extLst>
+              <a:ext uri="{FF2B5EF4-FFF2-40B4-BE49-F238E27FC236}">
+                <a16:creationId xmlns:a16="http://schemas.microsoft.com/office/drawing/2014/main" id="{962E9ACB-8183-AD2D-7005-ACEC72455141}"/>
+              </a:ext>
+            </a:extLst>
+          </p:cNvPr>
+          <p:cNvSpPr>
+            <a:spLocks noGrp="1"/>
+          </p:cNvSpPr>
+          <p:nvPr>
+            <p:ph type="subTitle" idx="1"/>
+          </p:nvPr>
+        </p:nvSpPr>
+        <p:spPr/>
+        <p:txBody>
+          <a:bodyPr/>
+          <a:lstStyle/>
+          <a:p>
+            <a:endParaRPr lang="de-DE"/>
+          </a:p>
+        </p:txBody>
+      </p:sp>
+      <p:pic>
+        <p:nvPicPr>
+          <p:cNvPr id="5" name="slide.url=https://www.polleverywhere.com/multiple_choice_polls/HqLooxXn1odvZujj1fu2x?display_state=instructions&amp;activity_state=opened&amp;state=opened&amp;flow=Instructor&amp;onscreen=persist">
+            <a:extLst>
+              <a:ext uri="{FF2B5EF4-FFF2-40B4-BE49-F238E27FC236}">
+                <a16:creationId xmlns:a16="http://schemas.microsoft.com/office/drawing/2014/main" id="{30FDA193-67F9-9A57-8A19-7F64F9C6CEA5}"/>
+              </a:ext>
+            </a:extLst>
+          </p:cNvPr>
+          <p:cNvPicPr>
+            <a:picLocks/>
+          </p:cNvPicPr>
+          <p:nvPr/>
+        </p:nvPicPr>
+        <p:blipFill>
+          <a:blip r:embed="rId3">
+            <a:extLst>
+              <a:ext uri="{28A0092B-C50C-407E-A947-70E740481C1C}">
+                <a14:useLocalDpi xmlns:a14="http://schemas.microsoft.com/office/drawing/2010/main" val="0"/>
+              </a:ext>
+            </a:extLst>
+          </a:blip>
+          <a:stretch>
+            <a:fillRect/>
+          </a:stretch>
+        </p:blipFill>
+        <p:spPr>
+          <a:xfrm>
+            <a:off x="63500" y="63500"/>
+            <a:ext cx="12065000" cy="6731000"/>
+          </a:xfrm>
+          <a:prstGeom prst="rect">
+            <a:avLst/>
+          </a:prstGeom>
+        </p:spPr>
+      </p:pic>
+    </p:spTree>
+    <p:extLst>
+      <p:ext uri="{BB962C8B-B14F-4D97-AF65-F5344CB8AC3E}">
+        <p14:creationId xmlns:p14="http://schemas.microsoft.com/office/powerpoint/2010/main" val="1756571760"/>
+      </p:ext>
+    </p:extLst>
+  </p:cSld>
+  <p:clrMapOvr>
+    <a:masterClrMapping/>
+  </p:clrMapOvr>
+</p:sld>
+</file>
+
+<file path=ppt/slides/slide7.xml><?xml version="1.0" encoding="utf-8"?>
+<p:sld xmlns:a="http://schemas.openxmlformats.org/drawingml/2006/main" xmlns:r="http://schemas.openxmlformats.org/officeDocument/2006/relationships" xmlns:p="http://schemas.openxmlformats.org/presentationml/2006/main">
+  <p:cSld>
+    <p:spTree>
+      <p:nvGrpSpPr>
+        <p:cNvPr id="1" name=""/>
+        <p:cNvGrpSpPr/>
+        <p:nvPr/>
+      </p:nvGrpSpPr>
+      <p:grpSpPr>
+        <a:xfrm>
+          <a:off x="0" y="0"/>
+          <a:ext cx="0" cy="0"/>
+          <a:chOff x="0" y="0"/>
+          <a:chExt cx="0" cy="0"/>
+        </a:xfrm>
+      </p:grpSpPr>
+      <p:sp>
+        <p:nvSpPr>
+          <p:cNvPr id="2" name="Titel 1">
+            <a:extLst>
+              <a:ext uri="{FF2B5EF4-FFF2-40B4-BE49-F238E27FC236}">
+                <a16:creationId xmlns:a16="http://schemas.microsoft.com/office/drawing/2014/main" id="{B5AC8E04-AA0D-DE4A-FE17-A06407E09964}"/>
+              </a:ext>
+            </a:extLst>
+          </p:cNvPr>
+          <p:cNvSpPr>
+            <a:spLocks noGrp="1"/>
+          </p:cNvSpPr>
+          <p:nvPr>
+            <p:ph type="ctrTitle"/>
+          </p:nvPr>
+        </p:nvSpPr>
+        <p:spPr/>
+        <p:txBody>
+          <a:bodyPr/>
+          <a:lstStyle/>
+          <a:p>
+            <a:endParaRPr lang="de-DE"/>
+          </a:p>
+        </p:txBody>
+      </p:sp>
+      <p:sp>
+        <p:nvSpPr>
+          <p:cNvPr id="3" name="Untertitel 2">
+            <a:extLst>
+              <a:ext uri="{FF2B5EF4-FFF2-40B4-BE49-F238E27FC236}">
+                <a16:creationId xmlns:a16="http://schemas.microsoft.com/office/drawing/2014/main" id="{A84FFF49-228C-7880-1E7A-7C99A76A2934}"/>
+              </a:ext>
+            </a:extLst>
+          </p:cNvPr>
+          <p:cNvSpPr>
+            <a:spLocks noGrp="1"/>
+          </p:cNvSpPr>
+          <p:nvPr>
+            <p:ph type="subTitle" idx="1"/>
+          </p:nvPr>
+        </p:nvSpPr>
+        <p:spPr/>
+        <p:txBody>
+          <a:bodyPr/>
+          <a:lstStyle/>
+          <a:p>
+            <a:endParaRPr lang="de-DE"/>
+          </a:p>
+        </p:txBody>
+      </p:sp>
+      <p:pic>
+        <p:nvPicPr>
+          <p:cNvPr id="5" name="slide.url=https://www.polleverywhere.com/multiple_choice_polls/HqLooxXn1odvZujj1fu2x?display_state=chart&amp;activity_state=closed&amp;state=closed&amp;flow=Instructor&amp;onscreen=persist">
+            <a:extLst>
+              <a:ext uri="{FF2B5EF4-FFF2-40B4-BE49-F238E27FC236}">
+                <a16:creationId xmlns:a16="http://schemas.microsoft.com/office/drawing/2014/main" id="{65F907BD-80EB-BD1F-ABA7-3DB8C3A75464}"/>
+              </a:ext>
+            </a:extLst>
+          </p:cNvPr>
+          <p:cNvPicPr>
+            <a:picLocks/>
+          </p:cNvPicPr>
+          <p:nvPr/>
+        </p:nvPicPr>
+        <p:blipFill>
+          <a:blip r:embed="rId3">
+            <a:extLst>
+              <a:ext uri="{28A0092B-C50C-407E-A947-70E740481C1C}">
+                <a14:useLocalDpi xmlns:a14="http://schemas.microsoft.com/office/drawing/2010/main" val="0"/>
+              </a:ext>
+            </a:extLst>
+          </a:blip>
+          <a:stretch>
+            <a:fillRect/>
+          </a:stretch>
+        </p:blipFill>
+        <p:spPr>
+          <a:xfrm>
+            <a:off x="63500" y="63500"/>
+            <a:ext cx="12065000" cy="6731000"/>
+          </a:xfrm>
+          <a:prstGeom prst="rect">
+            <a:avLst/>
+          </a:prstGeom>
+        </p:spPr>
+      </p:pic>
+    </p:spTree>
+    <p:extLst>
+      <p:ext uri="{BB962C8B-B14F-4D97-AF65-F5344CB8AC3E}">
+        <p14:creationId xmlns:p14="http://schemas.microsoft.com/office/powerpoint/2010/main" val="1461478577"/>
+      </p:ext>
+    </p:extLst>
+  </p:cSld>
+  <p:clrMapOvr>
+    <a:masterClrMapping/>
+  </p:clrMapOvr>
+</p:sld>
+</file>
+
+<file path=ppt/slides/slide8.xml><?xml version="1.0" encoding="utf-8"?>
+<p:sld xmlns:a="http://schemas.openxmlformats.org/drawingml/2006/main" xmlns:r="http://schemas.openxmlformats.org/officeDocument/2006/relationships" xmlns:p="http://schemas.openxmlformats.org/presentationml/2006/main">
+  <p:cSld>
+    <p:spTree>
+      <p:nvGrpSpPr>
+        <p:cNvPr id="1" name=""/>
+        <p:cNvGrpSpPr/>
+        <p:nvPr/>
+      </p:nvGrpSpPr>
+      <p:grpSpPr>
+        <a:xfrm>
+          <a:off x="0" y="0"/>
+          <a:ext cx="0" cy="0"/>
+          <a:chOff x="0" y="0"/>
+          <a:chExt cx="0" cy="0"/>
+        </a:xfrm>
+      </p:grpSpPr>
+      <p:sp>
+        <p:nvSpPr>
+          <p:cNvPr id="2" name="Titel 1">
+            <a:extLst>
+              <a:ext uri="{FF2B5EF4-FFF2-40B4-BE49-F238E27FC236}">
+                <a16:creationId xmlns:a16="http://schemas.microsoft.com/office/drawing/2014/main" id="{8A41ACA6-12BA-EDFD-2A0A-AE7FF664BA0F}"/>
+              </a:ext>
+            </a:extLst>
+          </p:cNvPr>
+          <p:cNvSpPr>
+            <a:spLocks noGrp="1"/>
+          </p:cNvSpPr>
+          <p:nvPr>
+            <p:ph type="ctrTitle"/>
+          </p:nvPr>
+        </p:nvSpPr>
+        <p:spPr/>
+        <p:txBody>
+          <a:bodyPr/>
+          <a:lstStyle/>
+          <a:p>
+            <a:endParaRPr lang="de-DE"/>
+          </a:p>
+        </p:txBody>
+      </p:sp>
+      <p:sp>
+        <p:nvSpPr>
+          <p:cNvPr id="3" name="Untertitel 2">
+            <a:extLst>
+              <a:ext uri="{FF2B5EF4-FFF2-40B4-BE49-F238E27FC236}">
+                <a16:creationId xmlns:a16="http://schemas.microsoft.com/office/drawing/2014/main" id="{62C40AF6-E1AD-D236-04C8-8CD3F7D52CA9}"/>
+              </a:ext>
+            </a:extLst>
+          </p:cNvPr>
+          <p:cNvSpPr>
+            <a:spLocks noGrp="1"/>
+          </p:cNvSpPr>
+          <p:nvPr>
+            <p:ph type="subTitle" idx="1"/>
+          </p:nvPr>
+        </p:nvSpPr>
+        <p:spPr/>
+        <p:txBody>
+          <a:bodyPr/>
+          <a:lstStyle/>
+          <a:p>
+            <a:endParaRPr lang="de-DE"/>
+          </a:p>
+        </p:txBody>
+      </p:sp>
+      <p:pic>
+        <p:nvPicPr>
+          <p:cNvPr id="5" name="slide.url=https://www.polleverywhere.com/multiple_choice_polls/HqLooxXn1odvZujj1fu2x?display_state=chart&amp;activity_state=closed&amp;display=correctness&amp;state=closed&amp;flow=Instructor&amp;onscreen=persist">
+            <a:extLst>
+              <a:ext uri="{FF2B5EF4-FFF2-40B4-BE49-F238E27FC236}">
+                <a16:creationId xmlns:a16="http://schemas.microsoft.com/office/drawing/2014/main" id="{3AE92289-7B32-E391-0C3D-2245471A621C}"/>
+              </a:ext>
+            </a:extLst>
+          </p:cNvPr>
+          <p:cNvPicPr>
+            <a:picLocks/>
+          </p:cNvPicPr>
+          <p:nvPr/>
+        </p:nvPicPr>
+        <p:blipFill>
+          <a:blip r:embed="rId3">
+            <a:extLst>
+              <a:ext uri="{28A0092B-C50C-407E-A947-70E740481C1C}">
+                <a14:useLocalDpi xmlns:a14="http://schemas.microsoft.com/office/drawing/2010/main" val="0"/>
+              </a:ext>
+            </a:extLst>
+          </a:blip>
+          <a:stretch>
+            <a:fillRect/>
+          </a:stretch>
+        </p:blipFill>
+        <p:spPr>
+          <a:xfrm>
+            <a:off x="63500" y="63500"/>
+            <a:ext cx="12065000" cy="6731000"/>
+          </a:xfrm>
+          <a:prstGeom prst="rect">
+            <a:avLst/>
+          </a:prstGeom>
+        </p:spPr>
+      </p:pic>
+    </p:spTree>
+    <p:extLst>
+      <p:ext uri="{BB962C8B-B14F-4D97-AF65-F5344CB8AC3E}">
+        <p14:creationId xmlns:p14="http://schemas.microsoft.com/office/powerpoint/2010/main" val="1483653433"/>
+      </p:ext>
+    </p:extLst>
+  </p:cSld>
+  <p:clrMapOvr>
+    <a:masterClrMapping/>
+  </p:clrMapOvr>
+</p:sld>
+</file>
+
+<file path=ppt/slides/slide9.xml><?xml version="1.0" encoding="utf-8"?>
+<p:sld xmlns:a="http://schemas.openxmlformats.org/drawingml/2006/main" xmlns:r="http://schemas.openxmlformats.org/officeDocument/2006/relationships" xmlns:p="http://schemas.openxmlformats.org/presentationml/2006/main">
+  <p:cSld>
+    <p:spTree>
+      <p:nvGrpSpPr>
+        <p:cNvPr id="1" name=""/>
+        <p:cNvGrpSpPr/>
+        <p:nvPr/>
+      </p:nvGrpSpPr>
+      <p:grpSpPr>
+        <a:xfrm>
+          <a:off x="0" y="0"/>
+          <a:ext cx="0" cy="0"/>
+          <a:chOff x="0" y="0"/>
+          <a:chExt cx="0" cy="0"/>
+        </a:xfrm>
+      </p:grpSpPr>
+      <p:sp>
+        <p:nvSpPr>
+          <p:cNvPr id="2" name="Titel 1">
+            <a:extLst>
+              <a:ext uri="{FF2B5EF4-FFF2-40B4-BE49-F238E27FC236}">
                 <a16:creationId xmlns:a16="http://schemas.microsoft.com/office/drawing/2014/main" id="{98C9A157-3760-8C40-94DE-6E43608A67EA}"/>
               </a:ext>
             </a:extLst>
@@ -6821,7 +8488,7 @@
           <p:nvPr/>
         </p:nvPicPr>
         <p:blipFill>
-          <a:blip r:embed="rId2"/>
+          <a:blip r:embed="rId3"/>
           <a:stretch>
             <a:fillRect/>
           </a:stretch>
@@ -6851,7 +8518,7 @@
           <p:nvPr/>
         </p:nvPicPr>
         <p:blipFill>
-          <a:blip r:embed="rId3"/>
+          <a:blip r:embed="rId4"/>
           <a:stretch>
             <a:fillRect/>
           </a:stretch>
@@ -6969,7 +8636,7 @@
         </p:grpSpPr>
         <mc:AlternateContent xmlns:mc="http://schemas.openxmlformats.org/markup-compatibility/2006" xmlns:p14="http://schemas.microsoft.com/office/powerpoint/2010/main">
           <mc:Choice Requires="p14">
-            <p:contentPart p14:bwMode="auto" r:id="rId4">
+            <p:contentPart p14:bwMode="auto" r:id="rId5">
               <p14:nvContentPartPr>
                 <p14:cNvPr id="12" name="Freihand 11">
                   <a:extLst>
@@ -7001,7 +8668,7 @@
                 <p:nvPr/>
               </p:nvPicPr>
               <p:blipFill>
-                <a:blip r:embed="rId5"/>
+                <a:blip r:embed="rId6"/>
                 <a:stretch>
                   <a:fillRect/>
                 </a:stretch>
@@ -7020,7 +8687,7 @@
         </mc:AlternateContent>
         <mc:AlternateContent xmlns:mc="http://schemas.openxmlformats.org/markup-compatibility/2006" xmlns:p14="http://schemas.microsoft.com/office/powerpoint/2010/main">
           <mc:Choice Requires="p14">
-            <p:contentPart p14:bwMode="auto" r:id="rId6">
+            <p:contentPart p14:bwMode="auto" r:id="rId7">
               <p14:nvContentPartPr>
                 <p14:cNvPr id="13" name="Freihand 12">
                   <a:extLst>
@@ -7052,7 +8719,7 @@
                 <p:nvPr/>
               </p:nvPicPr>
               <p:blipFill>
-                <a:blip r:embed="rId7"/>
+                <a:blip r:embed="rId8"/>
                 <a:stretch>
                   <a:fillRect/>
                 </a:stretch>
@@ -7092,7 +8759,7 @@
         </p:grpSpPr>
         <mc:AlternateContent xmlns:mc="http://schemas.openxmlformats.org/markup-compatibility/2006" xmlns:p14="http://schemas.microsoft.com/office/powerpoint/2010/main">
           <mc:Choice Requires="p14">
-            <p:contentPart p14:bwMode="auto" r:id="rId8">
+            <p:contentPart p14:bwMode="auto" r:id="rId9">
               <p14:nvContentPartPr>
                 <p14:cNvPr id="15" name="Freihand 14">
                   <a:extLst>
@@ -7124,7 +8791,7 @@
                 <p:nvPr/>
               </p:nvPicPr>
               <p:blipFill>
-                <a:blip r:embed="rId9"/>
+                <a:blip r:embed="rId10"/>
                 <a:stretch>
                   <a:fillRect/>
                 </a:stretch>
@@ -7143,7 +8810,7 @@
         </mc:AlternateContent>
         <mc:AlternateContent xmlns:mc="http://schemas.openxmlformats.org/markup-compatibility/2006" xmlns:p14="http://schemas.microsoft.com/office/powerpoint/2010/main">
           <mc:Choice Requires="p14">
-            <p:contentPart p14:bwMode="auto" r:id="rId10">
+            <p:contentPart p14:bwMode="auto" r:id="rId11">
               <p14:nvContentPartPr>
                 <p14:cNvPr id="16" name="Freihand 15">
                   <a:extLst>
@@ -7175,7 +8842,7 @@
                 <p:nvPr/>
               </p:nvPicPr>
               <p:blipFill>
-                <a:blip r:embed="rId11"/>
+                <a:blip r:embed="rId12"/>
                 <a:stretch>
                   <a:fillRect/>
                 </a:stretch>
@@ -7215,7 +8882,7 @@
         </p:grpSpPr>
         <mc:AlternateContent xmlns:mc="http://schemas.openxmlformats.org/markup-compatibility/2006" xmlns:p14="http://schemas.microsoft.com/office/powerpoint/2010/main">
           <mc:Choice Requires="p14">
-            <p:contentPart p14:bwMode="auto" r:id="rId12">
+            <p:contentPart p14:bwMode="auto" r:id="rId13">
               <p14:nvContentPartPr>
                 <p14:cNvPr id="6" name="Freihand 5">
                   <a:extLst>
@@ -7247,7 +8914,7 @@
                 <p:nvPr/>
               </p:nvPicPr>
               <p:blipFill>
-                <a:blip r:embed="rId13"/>
+                <a:blip r:embed="rId14"/>
                 <a:stretch>
                   <a:fillRect/>
                 </a:stretch>
@@ -7266,7 +8933,7 @@
         </mc:AlternateContent>
         <mc:AlternateContent xmlns:mc="http://schemas.openxmlformats.org/markup-compatibility/2006" xmlns:p14="http://schemas.microsoft.com/office/powerpoint/2010/main">
           <mc:Choice Requires="p14">
-            <p:contentPart p14:bwMode="auto" r:id="rId14">
+            <p:contentPart p14:bwMode="auto" r:id="rId15">
               <p14:nvContentPartPr>
                 <p14:cNvPr id="7" name="Freihand 6">
                   <a:extLst>
@@ -7298,7 +8965,7 @@
                 <p:nvPr/>
               </p:nvPicPr>
               <p:blipFill>
-                <a:blip r:embed="rId15"/>
+                <a:blip r:embed="rId16"/>
                 <a:stretch>
                   <a:fillRect/>
                 </a:stretch>
@@ -7317,7 +8984,7 @@
         </mc:AlternateContent>
         <mc:AlternateContent xmlns:mc="http://schemas.openxmlformats.org/markup-compatibility/2006" xmlns:p14="http://schemas.microsoft.com/office/powerpoint/2010/main">
           <mc:Choice Requires="p14">
-            <p:contentPart p14:bwMode="auto" r:id="rId16">
+            <p:contentPart p14:bwMode="auto" r:id="rId17">
               <p14:nvContentPartPr>
                 <p14:cNvPr id="9" name="Freihand 8">
                   <a:extLst>
@@ -7349,7 +9016,7 @@
                 <p:nvPr/>
               </p:nvPicPr>
               <p:blipFill>
-                <a:blip r:embed="rId17"/>
+                <a:blip r:embed="rId18"/>
                 <a:stretch>
                   <a:fillRect/>
                 </a:stretch>
@@ -7368,7 +9035,7 @@
         </mc:AlternateContent>
         <mc:AlternateContent xmlns:mc="http://schemas.openxmlformats.org/markup-compatibility/2006" xmlns:p14="http://schemas.microsoft.com/office/powerpoint/2010/main">
           <mc:Choice Requires="p14">
-            <p:contentPart p14:bwMode="auto" r:id="rId18">
+            <p:contentPart p14:bwMode="auto" r:id="rId19">
               <p14:nvContentPartPr>
                 <p14:cNvPr id="10" name="Freihand 9">
                   <a:extLst>
@@ -7400,7 +9067,7 @@
                 <p:nvPr/>
               </p:nvPicPr>
               <p:blipFill>
-                <a:blip r:embed="rId19"/>
+                <a:blip r:embed="rId20"/>
                 <a:stretch>
                   <a:fillRect/>
                 </a:stretch>
@@ -7419,7 +9086,7 @@
         </mc:AlternateContent>
         <mc:AlternateContent xmlns:mc="http://schemas.openxmlformats.org/markup-compatibility/2006" xmlns:p14="http://schemas.microsoft.com/office/powerpoint/2010/main">
           <mc:Choice Requires="p14">
-            <p:contentPart p14:bwMode="auto" r:id="rId20">
+            <p:contentPart p14:bwMode="auto" r:id="rId21">
               <p14:nvContentPartPr>
                 <p14:cNvPr id="18" name="Freihand 17">
                   <a:extLst>
@@ -7451,7 +9118,7 @@
                 <p:nvPr/>
               </p:nvPicPr>
               <p:blipFill>
-                <a:blip r:embed="rId21"/>
+                <a:blip r:embed="rId22"/>
                 <a:stretch>
                   <a:fillRect/>
                 </a:stretch>
@@ -7470,7 +9137,7 @@
         </mc:AlternateContent>
         <mc:AlternateContent xmlns:mc="http://schemas.openxmlformats.org/markup-compatibility/2006" xmlns:p14="http://schemas.microsoft.com/office/powerpoint/2010/main">
           <mc:Choice Requires="p14">
-            <p:contentPart p14:bwMode="auto" r:id="rId22">
+            <p:contentPart p14:bwMode="auto" r:id="rId23">
               <p14:nvContentPartPr>
                 <p14:cNvPr id="19" name="Freihand 18">
                   <a:extLst>
@@ -7502,7 +9169,7 @@
                 <p:nvPr/>
               </p:nvPicPr>
               <p:blipFill>
-                <a:blip r:embed="rId23"/>
+                <a:blip r:embed="rId24"/>
                 <a:stretch>
                   <a:fillRect/>
                 </a:stretch>
@@ -7524,365 +9191,6 @@
     <p:extLst>
       <p:ext uri="{BB962C8B-B14F-4D97-AF65-F5344CB8AC3E}">
         <p14:creationId xmlns:p14="http://schemas.microsoft.com/office/powerpoint/2010/main" val="1282737014"/>
-      </p:ext>
-    </p:extLst>
-  </p:cSld>
-  <p:clrMapOvr>
-    <a:masterClrMapping/>
-  </p:clrMapOvr>
-</p:sld>
-</file>
-
-<file path=ppt/slides/slide7.xml><?xml version="1.0" encoding="utf-8"?>
-<p:sld xmlns:a="http://schemas.openxmlformats.org/drawingml/2006/main" xmlns:r="http://schemas.openxmlformats.org/officeDocument/2006/relationships" xmlns:p="http://schemas.openxmlformats.org/presentationml/2006/main">
-  <p:cSld>
-    <p:spTree>
-      <p:nvGrpSpPr>
-        <p:cNvPr id="1" name=""/>
-        <p:cNvGrpSpPr/>
-        <p:nvPr/>
-      </p:nvGrpSpPr>
-      <p:grpSpPr>
-        <a:xfrm>
-          <a:off x="0" y="0"/>
-          <a:ext cx="0" cy="0"/>
-          <a:chOff x="0" y="0"/>
-          <a:chExt cx="0" cy="0"/>
-        </a:xfrm>
-      </p:grpSpPr>
-      <p:sp>
-        <p:nvSpPr>
-          <p:cNvPr id="2" name="Titel 1">
-            <a:extLst>
-              <a:ext uri="{FF2B5EF4-FFF2-40B4-BE49-F238E27FC236}">
-                <a16:creationId xmlns:a16="http://schemas.microsoft.com/office/drawing/2014/main" id="{392D7D64-17FB-444B-B0FC-332B8A749537}"/>
-              </a:ext>
-            </a:extLst>
-          </p:cNvPr>
-          <p:cNvSpPr>
-            <a:spLocks noGrp="1"/>
-          </p:cNvSpPr>
-          <p:nvPr>
-            <p:ph type="title"/>
-          </p:nvPr>
-        </p:nvSpPr>
-        <p:spPr/>
-        <p:txBody>
-          <a:bodyPr/>
-          <a:lstStyle/>
-          <a:p>
-            <a:r>
-              <a:rPr lang="de-DE" dirty="0" err="1"/>
-              <a:t>Arduino</a:t>
-            </a:r>
-            <a:r>
-              <a:rPr lang="de-DE" dirty="0"/>
-              <a:t> IDE 2.0 Debugging</a:t>
-            </a:r>
-          </a:p>
-        </p:txBody>
-      </p:sp>
-      <p:sp>
-        <p:nvSpPr>
-          <p:cNvPr id="4" name="Inhaltsplatzhalter 3">
-            <a:extLst>
-              <a:ext uri="{FF2B5EF4-FFF2-40B4-BE49-F238E27FC236}">
-                <a16:creationId xmlns:a16="http://schemas.microsoft.com/office/drawing/2014/main" id="{1D6E604F-B399-C249-A541-F9EDFDF20534}"/>
-              </a:ext>
-            </a:extLst>
-          </p:cNvPr>
-          <p:cNvSpPr>
-            <a:spLocks noGrp="1"/>
-          </p:cNvSpPr>
-          <p:nvPr>
-            <p:ph idx="1"/>
-          </p:nvPr>
-        </p:nvSpPr>
-        <p:spPr/>
-        <p:txBody>
-          <a:bodyPr/>
-          <a:lstStyle/>
-          <a:p>
-            <a:r>
-              <a:rPr lang="de-DE" dirty="0">
-                <a:hlinkClick r:id="rId2"/>
-              </a:rPr>
-              <a:t>https://docs.arduino.cc/software/ide-v2/tutorials/ide-v2-debugger</a:t>
-            </a:r>
-            <a:endParaRPr lang="de-DE" dirty="0"/>
-          </a:p>
-          <a:p>
-            <a:r>
-              <a:rPr lang="de-DE" dirty="0"/>
-              <a:t>Nur mit manchen Boards unterstützt (SAMD MKR Boards wie MKR Zero)</a:t>
-            </a:r>
-          </a:p>
-        </p:txBody>
-      </p:sp>
-    </p:spTree>
-    <p:extLst>
-      <p:ext uri="{BB962C8B-B14F-4D97-AF65-F5344CB8AC3E}">
-        <p14:creationId xmlns:p14="http://schemas.microsoft.com/office/powerpoint/2010/main" val="1352385898"/>
-      </p:ext>
-    </p:extLst>
-  </p:cSld>
-  <p:clrMapOvr>
-    <a:masterClrMapping/>
-  </p:clrMapOvr>
-</p:sld>
-</file>
-
-<file path=ppt/slides/slide8.xml><?xml version="1.0" encoding="utf-8"?>
-<p:sld xmlns:a="http://schemas.openxmlformats.org/drawingml/2006/main" xmlns:r="http://schemas.openxmlformats.org/officeDocument/2006/relationships" xmlns:p="http://schemas.openxmlformats.org/presentationml/2006/main">
-  <p:cSld>
-    <p:spTree>
-      <p:nvGrpSpPr>
-        <p:cNvPr id="1" name=""/>
-        <p:cNvGrpSpPr/>
-        <p:nvPr/>
-      </p:nvGrpSpPr>
-      <p:grpSpPr>
-        <a:xfrm>
-          <a:off x="0" y="0"/>
-          <a:ext cx="0" cy="0"/>
-          <a:chOff x="0" y="0"/>
-          <a:chExt cx="0" cy="0"/>
-        </a:xfrm>
-      </p:grpSpPr>
-      <p:pic>
-        <p:nvPicPr>
-          <p:cNvPr id="1026" name="Picture 2" descr="Going between breakpoints.">
-            <a:extLst>
-              <a:ext uri="{FF2B5EF4-FFF2-40B4-BE49-F238E27FC236}">
-                <a16:creationId xmlns:a16="http://schemas.microsoft.com/office/drawing/2014/main" id="{C0B75F9A-864D-BC4E-945C-745D614047B6}"/>
-              </a:ext>
-            </a:extLst>
-          </p:cNvPr>
-          <p:cNvPicPr>
-            <a:picLocks noChangeAspect="1" noChangeArrowheads="1"/>
-          </p:cNvPicPr>
-          <p:nvPr/>
-        </p:nvPicPr>
-        <p:blipFill>
-          <a:blip r:embed="rId2">
-            <a:extLst>
-              <a:ext uri="{28A0092B-C50C-407E-A947-70E740481C1C}">
-                <a14:useLocalDpi xmlns:a14="http://schemas.microsoft.com/office/drawing/2010/main" val="0"/>
-              </a:ext>
-            </a:extLst>
-          </a:blip>
-          <a:srcRect/>
-          <a:stretch>
-            <a:fillRect/>
-          </a:stretch>
-        </p:blipFill>
-        <p:spPr bwMode="auto">
-          <a:xfrm>
-            <a:off x="1639888" y="0"/>
-            <a:ext cx="8912225" cy="6858000"/>
-          </a:xfrm>
-          <a:prstGeom prst="rect">
-            <a:avLst/>
-          </a:prstGeom>
-          <a:noFill/>
-          <a:extLst>
-            <a:ext uri="{909E8E84-426E-40DD-AFC4-6F175D3DCCD1}">
-              <a14:hiddenFill xmlns:a14="http://schemas.microsoft.com/office/drawing/2010/main">
-                <a:solidFill>
-                  <a:srgbClr val="FFFFFF"/>
-                </a:solidFill>
-              </a14:hiddenFill>
-            </a:ext>
-          </a:extLst>
-        </p:spPr>
-      </p:pic>
-    </p:spTree>
-    <p:extLst>
-      <p:ext uri="{BB962C8B-B14F-4D97-AF65-F5344CB8AC3E}">
-        <p14:creationId xmlns:p14="http://schemas.microsoft.com/office/powerpoint/2010/main" val="1029990919"/>
-      </p:ext>
-    </p:extLst>
-  </p:cSld>
-  <p:clrMapOvr>
-    <a:masterClrMapping/>
-  </p:clrMapOvr>
-</p:sld>
-</file>
-
-<file path=ppt/slides/slide9.xml><?xml version="1.0" encoding="utf-8"?>
-<p:sld xmlns:a="http://schemas.openxmlformats.org/drawingml/2006/main" xmlns:r="http://schemas.openxmlformats.org/officeDocument/2006/relationships" xmlns:p="http://schemas.openxmlformats.org/presentationml/2006/main">
-  <p:cSld>
-    <p:spTree>
-      <p:nvGrpSpPr>
-        <p:cNvPr id="1" name=""/>
-        <p:cNvGrpSpPr/>
-        <p:nvPr/>
-      </p:nvGrpSpPr>
-      <p:grpSpPr>
-        <a:xfrm>
-          <a:off x="0" y="0"/>
-          <a:ext cx="0" cy="0"/>
-          <a:chOff x="0" y="0"/>
-          <a:chExt cx="0" cy="0"/>
-        </a:xfrm>
-      </p:grpSpPr>
-      <p:sp>
-        <p:nvSpPr>
-          <p:cNvPr id="2" name="Titel 1">
-            <a:extLst>
-              <a:ext uri="{FF2B5EF4-FFF2-40B4-BE49-F238E27FC236}">
-                <a16:creationId xmlns:a16="http://schemas.microsoft.com/office/drawing/2014/main" id="{334936CD-7D3C-B341-9FFC-2AF7C2C2928F}"/>
-              </a:ext>
-            </a:extLst>
-          </p:cNvPr>
-          <p:cNvSpPr>
-            <a:spLocks noGrp="1"/>
-          </p:cNvSpPr>
-          <p:nvPr>
-            <p:ph type="title"/>
-          </p:nvPr>
-        </p:nvSpPr>
-        <p:spPr/>
-        <p:txBody>
-          <a:bodyPr/>
-          <a:lstStyle/>
-          <a:p>
-            <a:r>
-              <a:rPr lang="de-DE" dirty="0"/>
-              <a:t>Attribution und Quellen</a:t>
-            </a:r>
-          </a:p>
-        </p:txBody>
-      </p:sp>
-      <p:sp>
-        <p:nvSpPr>
-          <p:cNvPr id="3" name="Textplatzhalter 2">
-            <a:extLst>
-              <a:ext uri="{FF2B5EF4-FFF2-40B4-BE49-F238E27FC236}">
-                <a16:creationId xmlns:a16="http://schemas.microsoft.com/office/drawing/2014/main" id="{DEF89A04-C556-384F-8F4C-62B2495131C1}"/>
-              </a:ext>
-            </a:extLst>
-          </p:cNvPr>
-          <p:cNvSpPr>
-            <a:spLocks noGrp="1"/>
-          </p:cNvSpPr>
-          <p:nvPr>
-            <p:ph type="body" idx="1"/>
-          </p:nvPr>
-        </p:nvSpPr>
-        <p:spPr/>
-        <p:txBody>
-          <a:bodyPr>
-            <a:normAutofit fontScale="47500" lnSpcReduction="20000"/>
-          </a:bodyPr>
-          <a:lstStyle/>
-          <a:p>
-            <a:r>
-              <a:rPr lang="de-DE" dirty="0"/>
-              <a:t>Diese Folien wurden von Peter </a:t>
-            </a:r>
-            <a:r>
-              <a:rPr lang="de-DE" dirty="0" err="1"/>
-              <a:t>Bendel</a:t>
-            </a:r>
-            <a:r>
-              <a:rPr lang="de-DE" dirty="0"/>
-              <a:t> erstellt.</a:t>
-            </a:r>
-          </a:p>
-          <a:p>
-            <a:r>
-              <a:rPr lang="de-DE" dirty="0"/>
-              <a:t>Für diese Folien gilt die </a:t>
-            </a:r>
-            <a:r>
-              <a:rPr lang="de-DE" b="1" dirty="0"/>
-              <a:t>Attribution-</a:t>
-            </a:r>
-            <a:r>
-              <a:rPr lang="de-DE" b="1" dirty="0" err="1"/>
-              <a:t>ShareAlike</a:t>
-            </a:r>
-            <a:r>
-              <a:rPr lang="de-DE" b="1" dirty="0"/>
-              <a:t> 3.0 </a:t>
-            </a:r>
-            <a:r>
-              <a:rPr lang="de-DE" b="1" dirty="0" err="1"/>
-              <a:t>Unported</a:t>
-            </a:r>
-            <a:endParaRPr lang="de-DE" b="1" dirty="0"/>
-          </a:p>
-          <a:p>
-            <a:r>
-              <a:rPr lang="de-DE" dirty="0"/>
-              <a:t> Lizenz, </a:t>
-            </a:r>
-            <a:r>
-              <a:rPr lang="de-DE" dirty="0">
-                <a:hlinkClick r:id="rId2"/>
-              </a:rPr>
-              <a:t>https://creativecommons.org/licenses/by-sa/3.0/</a:t>
-            </a:r>
-            <a:endParaRPr lang="de-DE" dirty="0"/>
-          </a:p>
-          <a:p>
-            <a:r>
-              <a:rPr lang="de-DE" dirty="0"/>
-              <a:t>Quellen: </a:t>
-            </a:r>
-          </a:p>
-          <a:p>
-            <a:r>
-              <a:rPr lang="de-DE" dirty="0">
-                <a:hlinkClick r:id="rId3"/>
-              </a:rPr>
-              <a:t>https://docs.arduino.cc/software/ide-v2/tutorials/ide-v2-debugger</a:t>
-            </a:r>
-            <a:endParaRPr lang="de-DE" dirty="0"/>
-          </a:p>
-          <a:p>
-            <a:r>
-              <a:rPr lang="de-DE" dirty="0"/>
-              <a:t>https://</a:t>
-            </a:r>
-            <a:r>
-              <a:rPr lang="de-DE" dirty="0" err="1"/>
-              <a:t>github.com</a:t>
-            </a:r>
-            <a:r>
-              <a:rPr lang="de-DE" dirty="0"/>
-              <a:t>/</a:t>
-            </a:r>
-            <a:r>
-              <a:rPr lang="de-DE" dirty="0" err="1"/>
-              <a:t>liffiton</a:t>
-            </a:r>
-            <a:r>
-              <a:rPr lang="de-DE" dirty="0"/>
-              <a:t>/</a:t>
-            </a:r>
-            <a:r>
-              <a:rPr lang="de-DE" dirty="0" err="1"/>
-              <a:t>Arduino</a:t>
-            </a:r>
-            <a:r>
-              <a:rPr lang="de-DE" dirty="0"/>
-              <a:t>-Cheat-Sheet</a:t>
-            </a:r>
-          </a:p>
-          <a:p>
-            <a:endParaRPr lang="de-DE" dirty="0"/>
-          </a:p>
-          <a:p>
-            <a:endParaRPr lang="de-DE" dirty="0"/>
-          </a:p>
-        </p:txBody>
-      </p:sp>
-    </p:spTree>
-    <p:extLst>
-      <p:ext uri="{BB962C8B-B14F-4D97-AF65-F5344CB8AC3E}">
-        <p14:creationId xmlns:p14="http://schemas.microsoft.com/office/powerpoint/2010/main" val="3103116398"/>
       </p:ext>
     </p:extLst>
   </p:cSld>
@@ -8483,9 +9791,12 @@
 </file>
 
 <file path=customXml/item1.xml><?xml version="1.0" encoding="utf-8"?>
-<p:properties xmlns:p="http://schemas.microsoft.com/office/2006/metadata/properties" xmlns:xsi="http://www.w3.org/2001/XMLSchema-instance" xmlns:pc="http://schemas.microsoft.com/office/infopath/2007/PartnerControls">
-  <documentManagement/>
-</p:properties>
+<?mso-contentType ?>
+<FormTemplates xmlns="http://schemas.microsoft.com/sharepoint/v3/contenttype/forms">
+  <Display>DocumentLibraryForm</Display>
+  <Edit>DocumentLibraryForm</Edit>
+  <New>DocumentLibraryForm</New>
+</FormTemplates>
 </file>
 
 <file path=customXml/item2.xml><?xml version="1.0" encoding="utf-8"?>
@@ -8706,27 +10017,15 @@
 </file>
 
 <file path=customXml/item3.xml><?xml version="1.0" encoding="utf-8"?>
-<?mso-contentType ?>
-<FormTemplates xmlns="http://schemas.microsoft.com/sharepoint/v3/contenttype/forms">
-  <Display>DocumentLibraryForm</Display>
-  <Edit>DocumentLibraryForm</Edit>
-  <New>DocumentLibraryForm</New>
-</FormTemplates>
+<p:properties xmlns:p="http://schemas.microsoft.com/office/2006/metadata/properties" xmlns:xsi="http://www.w3.org/2001/XMLSchema-instance" xmlns:pc="http://schemas.microsoft.com/office/infopath/2007/PartnerControls">
+  <documentManagement/>
+</p:properties>
 </file>
 
 <file path=customXml/itemProps1.xml><?xml version="1.0" encoding="utf-8"?>
-<ds:datastoreItem xmlns:ds="http://schemas.openxmlformats.org/officeDocument/2006/customXml" ds:itemID="{68B22CCF-3790-4DAF-9B94-BBE8105DACDB}">
+<ds:datastoreItem xmlns:ds="http://schemas.openxmlformats.org/officeDocument/2006/customXml" ds:itemID="{19285E5B-5F99-40AB-B4B4-B67FE3E29063}">
   <ds:schemaRefs>
-    <ds:schemaRef ds:uri="http://purl.org/dc/elements/1.1/"/>
-    <ds:schemaRef ds:uri="http://schemas.openxmlformats.org/package/2006/metadata/core-properties"/>
-    <ds:schemaRef ds:uri="http://schemas.microsoft.com/office/2006/documentManagement/types"/>
-    <ds:schemaRef ds:uri="7e0397fa-c04e-494e-b1f1-774ad14ae133"/>
-    <ds:schemaRef ds:uri="http://www.w3.org/XML/1998/namespace"/>
-    <ds:schemaRef ds:uri="http://schemas.microsoft.com/office/infopath/2007/PartnerControls"/>
-    <ds:schemaRef ds:uri="http://purl.org/dc/dcmitype/"/>
-    <ds:schemaRef ds:uri="8413540a-1bb6-4053-94a1-f89835fea1c0"/>
-    <ds:schemaRef ds:uri="http://schemas.microsoft.com/office/2006/metadata/properties"/>
-    <ds:schemaRef ds:uri="http://purl.org/dc/terms/"/>
+    <ds:schemaRef ds:uri="http://schemas.microsoft.com/sharepoint/v3/contenttype/forms"/>
   </ds:schemaRefs>
 </ds:datastoreItem>
 </file>
@@ -8751,9 +10050,18 @@
 </file>
 
 <file path=customXml/itemProps3.xml><?xml version="1.0" encoding="utf-8"?>
-<ds:datastoreItem xmlns:ds="http://schemas.openxmlformats.org/officeDocument/2006/customXml" ds:itemID="{19285E5B-5F99-40AB-B4B4-B67FE3E29063}">
+<ds:datastoreItem xmlns:ds="http://schemas.openxmlformats.org/officeDocument/2006/customXml" ds:itemID="{68B22CCF-3790-4DAF-9B94-BBE8105DACDB}">
   <ds:schemaRefs>
-    <ds:schemaRef ds:uri="http://schemas.microsoft.com/sharepoint/v3/contenttype/forms"/>
+    <ds:schemaRef ds:uri="http://purl.org/dc/elements/1.1/"/>
+    <ds:schemaRef ds:uri="http://schemas.openxmlformats.org/package/2006/metadata/core-properties"/>
+    <ds:schemaRef ds:uri="http://schemas.microsoft.com/office/2006/documentManagement/types"/>
+    <ds:schemaRef ds:uri="7e0397fa-c04e-494e-b1f1-774ad14ae133"/>
+    <ds:schemaRef ds:uri="http://www.w3.org/XML/1998/namespace"/>
+    <ds:schemaRef ds:uri="http://schemas.microsoft.com/office/infopath/2007/PartnerControls"/>
+    <ds:schemaRef ds:uri="http://purl.org/dc/dcmitype/"/>
+    <ds:schemaRef ds:uri="8413540a-1bb6-4053-94a1-f89835fea1c0"/>
+    <ds:schemaRef ds:uri="http://schemas.microsoft.com/office/2006/metadata/properties"/>
+    <ds:schemaRef ds:uri="http://purl.org/dc/terms/"/>
   </ds:schemaRefs>
 </ds:datastoreItem>
 </file>
</xml_diff>